<commit_message>
remove - innecesary stuff
</commit_message>
<xml_diff>
--- a/Projects/UNA/Asesoría Jmeter/Capacitación Jmeter - Sesión 1.pptx
+++ b/Projects/UNA/Asesoría Jmeter/Capacitación Jmeter - Sesión 1.pptx
@@ -5,22 +5,23 @@
     <p:sldMasterId id="2147493690" r:id="rId4"/>
   </p:sldMasterIdLst>
   <p:notesMasterIdLst>
-    <p:notesMasterId r:id="rId18"/>
+    <p:notesMasterId r:id="rId19"/>
   </p:notesMasterIdLst>
   <p:sldIdLst>
     <p:sldId id="270" r:id="rId5"/>
     <p:sldId id="262" r:id="rId6"/>
     <p:sldId id="267" r:id="rId7"/>
-    <p:sldId id="395" r:id="rId8"/>
+    <p:sldId id="402" r:id="rId8"/>
     <p:sldId id="274" r:id="rId9"/>
-    <p:sldId id="275" r:id="rId10"/>
-    <p:sldId id="396" r:id="rId11"/>
-    <p:sldId id="397" r:id="rId12"/>
-    <p:sldId id="398" r:id="rId13"/>
-    <p:sldId id="399" r:id="rId14"/>
-    <p:sldId id="400" r:id="rId15"/>
-    <p:sldId id="401" r:id="rId16"/>
-    <p:sldId id="317" r:id="rId17"/>
+    <p:sldId id="403" r:id="rId10"/>
+    <p:sldId id="275" r:id="rId11"/>
+    <p:sldId id="396" r:id="rId12"/>
+    <p:sldId id="397" r:id="rId13"/>
+    <p:sldId id="398" r:id="rId14"/>
+    <p:sldId id="399" r:id="rId15"/>
+    <p:sldId id="400" r:id="rId16"/>
+    <p:sldId id="401" r:id="rId17"/>
+    <p:sldId id="317" r:id="rId18"/>
   </p:sldIdLst>
   <p:sldSz cx="9144000" cy="5715000" type="screen16x10"/>
   <p:notesSz cx="6858000" cy="9144000"/>
@@ -166,6 +167,10 @@
     </p:ext>
   </p:extLst>
 </p:presentation>
+</file>
+
+<file path=ppt/revisionInfo.xml><?xml version="1.0" encoding="utf-8"?>
+<p1510:revInfo xmlns:a="http://schemas.openxmlformats.org/drawingml/2006/main" xmlns:r="http://schemas.openxmlformats.org/officeDocument/2006/relationships" xmlns:p1510="http://schemas.microsoft.com/office/powerpoint/2015/10/main"/>
 </file>
 
 <file path=ppt/diagrams/colors1.xml><?xml version="1.0" encoding="utf-8"?>
@@ -997,10 +1002,9 @@
         <a:lstStyle/>
         <a:p>
           <a:r>
-            <a:rPr lang="es-CR" b="1" noProof="0" dirty="0" smtClean="0"/>
-            <a:t>Introducción a Pruebas de rendimiento y Jmeter</a:t>
+            <a:rPr lang="es-CR" b="1" noProof="0" dirty="0"/>
+            <a:t>Introducción a Pruebas de rendimiento y Conceptos básicos</a:t>
           </a:r>
-          <a:endParaRPr lang="es-CR" b="1" noProof="0" dirty="0"/>
         </a:p>
       </dgm:t>
     </dgm:pt>
@@ -1026,43 +1030,6 @@
         </a:p>
       </dgm:t>
     </dgm:pt>
-    <dgm:pt modelId="{F65930DA-E232-4D48-BC41-68AA11BE96C1}">
-      <dgm:prSet phldrT="[Text]"/>
-      <dgm:spPr/>
-      <dgm:t>
-        <a:bodyPr/>
-        <a:lstStyle/>
-        <a:p>
-          <a:r>
-            <a:rPr lang="es-CR" b="1" noProof="0" smtClean="0"/>
-            <a:t>Componentes básicos</a:t>
-          </a:r>
-          <a:endParaRPr lang="es-CR" b="1" noProof="0" dirty="0"/>
-        </a:p>
-      </dgm:t>
-    </dgm:pt>
-    <dgm:pt modelId="{3D0801E1-E736-4656-838C-743DC1DA6B27}" type="parTrans" cxnId="{5B23195A-3DE2-420C-8A81-FE91F4B1F0BA}">
-      <dgm:prSet/>
-      <dgm:spPr/>
-      <dgm:t>
-        <a:bodyPr/>
-        <a:lstStyle/>
-        <a:p>
-          <a:endParaRPr lang="es-CR"/>
-        </a:p>
-      </dgm:t>
-    </dgm:pt>
-    <dgm:pt modelId="{D9BA9DE5-1A37-48F7-A230-5F507A75837B}" type="sibTrans" cxnId="{5B23195A-3DE2-420C-8A81-FE91F4B1F0BA}">
-      <dgm:prSet/>
-      <dgm:spPr/>
-      <dgm:t>
-        <a:bodyPr/>
-        <a:lstStyle/>
-        <a:p>
-          <a:endParaRPr lang="es-CR"/>
-        </a:p>
-      </dgm:t>
-    </dgm:pt>
     <dgm:pt modelId="{35774A53-64A3-45C8-892D-59E152D7C1B8}">
       <dgm:prSet phldrT="[Text]"/>
       <dgm:spPr/>
@@ -1071,10 +1038,9 @@
         <a:lstStyle/>
         <a:p>
           <a:r>
-            <a:rPr lang="es-CR" b="1" noProof="0" dirty="0" smtClean="0"/>
-            <a:t>Práctica</a:t>
+            <a:rPr lang="es-CR" b="1" noProof="0" dirty="0"/>
+            <a:t>Introducción a Jmeter</a:t>
           </a:r>
-          <a:endParaRPr lang="es-CR" b="1" noProof="0" dirty="0"/>
         </a:p>
       </dgm:t>
     </dgm:pt>
@@ -1109,51 +1075,30 @@
         </dgm:presLayoutVars>
       </dgm:prSet>
       <dgm:spPr/>
-      <dgm:t>
-        <a:bodyPr/>
-        <a:lstStyle/>
-        <a:p>
-          <a:endParaRPr lang="en-US"/>
-        </a:p>
-      </dgm:t>
     </dgm:pt>
     <dgm:pt modelId="{750888AB-AD9B-4B77-89E8-4D1460C909BA}" type="pres">
       <dgm:prSet presAssocID="{C014E6F3-B358-4549-BD6C-83DF5ADDD954}" presName="parentLin" presStyleCnt="0"/>
       <dgm:spPr/>
     </dgm:pt>
     <dgm:pt modelId="{6680E501-C02D-414A-9C36-87B9F2458B9D}" type="pres">
-      <dgm:prSet presAssocID="{C014E6F3-B358-4549-BD6C-83DF5ADDD954}" presName="parentLeftMargin" presStyleLbl="node1" presStyleIdx="0" presStyleCnt="3"/>
+      <dgm:prSet presAssocID="{C014E6F3-B358-4549-BD6C-83DF5ADDD954}" presName="parentLeftMargin" presStyleLbl="node1" presStyleIdx="0" presStyleCnt="2"/>
       <dgm:spPr/>
-      <dgm:t>
-        <a:bodyPr/>
-        <a:lstStyle/>
-        <a:p>
-          <a:endParaRPr lang="en-US"/>
-        </a:p>
-      </dgm:t>
     </dgm:pt>
     <dgm:pt modelId="{4E6E6167-CAF6-4082-905D-B647E25B6FD2}" type="pres">
-      <dgm:prSet presAssocID="{C014E6F3-B358-4549-BD6C-83DF5ADDD954}" presName="parentText" presStyleLbl="node1" presStyleIdx="0" presStyleCnt="3">
+      <dgm:prSet presAssocID="{C014E6F3-B358-4549-BD6C-83DF5ADDD954}" presName="parentText" presStyleLbl="node1" presStyleIdx="0" presStyleCnt="2">
         <dgm:presLayoutVars>
           <dgm:chMax val="0"/>
           <dgm:bulletEnabled val="1"/>
         </dgm:presLayoutVars>
       </dgm:prSet>
       <dgm:spPr/>
-      <dgm:t>
-        <a:bodyPr/>
-        <a:lstStyle/>
-        <a:p>
-          <a:endParaRPr lang="en-US"/>
-        </a:p>
-      </dgm:t>
     </dgm:pt>
     <dgm:pt modelId="{4E0D1028-EFED-4A46-BC93-88B83439399C}" type="pres">
       <dgm:prSet presAssocID="{C014E6F3-B358-4549-BD6C-83DF5ADDD954}" presName="negativeSpace" presStyleCnt="0"/>
       <dgm:spPr/>
     </dgm:pt>
     <dgm:pt modelId="{BDA7A0C6-B9F5-4C1F-A064-AA5D79140A7D}" type="pres">
-      <dgm:prSet presAssocID="{C014E6F3-B358-4549-BD6C-83DF5ADDD954}" presName="childText" presStyleLbl="conFgAcc1" presStyleIdx="0" presStyleCnt="3">
+      <dgm:prSet presAssocID="{C014E6F3-B358-4549-BD6C-83DF5ADDD954}" presName="childText" presStyleLbl="conFgAcc1" presStyleIdx="0" presStyleCnt="2">
         <dgm:presLayoutVars>
           <dgm:bulletEnabled val="1"/>
         </dgm:presLayoutVars>
@@ -1164,120 +1109,42 @@
       <dgm:prSet presAssocID="{D271B80B-84B9-486E-A6C8-4D9B94362458}" presName="spaceBetweenRectangles" presStyleCnt="0"/>
       <dgm:spPr/>
     </dgm:pt>
-    <dgm:pt modelId="{20E3AAB7-F6FA-4D5E-A15F-33AB526983DC}" type="pres">
-      <dgm:prSet presAssocID="{F65930DA-E232-4D48-BC41-68AA11BE96C1}" presName="parentLin" presStyleCnt="0"/>
+    <dgm:pt modelId="{757630F4-7851-45EB-81BB-C9BDEC46394B}" type="pres">
+      <dgm:prSet presAssocID="{35774A53-64A3-45C8-892D-59E152D7C1B8}" presName="parentLin" presStyleCnt="0"/>
       <dgm:spPr/>
     </dgm:pt>
-    <dgm:pt modelId="{378C3CF2-1E02-4B67-B80C-746CD23206DA}" type="pres">
-      <dgm:prSet presAssocID="{F65930DA-E232-4D48-BC41-68AA11BE96C1}" presName="parentLeftMargin" presStyleLbl="node1" presStyleIdx="0" presStyleCnt="3"/>
+    <dgm:pt modelId="{E4D96EA2-D7BC-4C14-BE7C-B4DF3A60D384}" type="pres">
+      <dgm:prSet presAssocID="{35774A53-64A3-45C8-892D-59E152D7C1B8}" presName="parentLeftMargin" presStyleLbl="node1" presStyleIdx="0" presStyleCnt="2"/>
       <dgm:spPr/>
-      <dgm:t>
-        <a:bodyPr/>
-        <a:lstStyle/>
-        <a:p>
-          <a:endParaRPr lang="en-US"/>
-        </a:p>
-      </dgm:t>
     </dgm:pt>
-    <dgm:pt modelId="{208F2C27-868C-4547-9279-7C03FFBA9E60}" type="pres">
-      <dgm:prSet presAssocID="{F65930DA-E232-4D48-BC41-68AA11BE96C1}" presName="parentText" presStyleLbl="node1" presStyleIdx="1" presStyleCnt="3">
+    <dgm:pt modelId="{D8A0AA6B-15A5-4D08-AF1A-90185B5CB63D}" type="pres">
+      <dgm:prSet presAssocID="{35774A53-64A3-45C8-892D-59E152D7C1B8}" presName="parentText" presStyleLbl="node1" presStyleIdx="1" presStyleCnt="2">
         <dgm:presLayoutVars>
           <dgm:chMax val="0"/>
           <dgm:bulletEnabled val="1"/>
         </dgm:presLayoutVars>
       </dgm:prSet>
       <dgm:spPr/>
-      <dgm:t>
-        <a:bodyPr/>
-        <a:lstStyle/>
-        <a:p>
-          <a:endParaRPr lang="en-US"/>
-        </a:p>
-      </dgm:t>
-    </dgm:pt>
-    <dgm:pt modelId="{65CFDBB5-5D46-46F2-BEBC-9D7032FA8FFB}" type="pres">
-      <dgm:prSet presAssocID="{F65930DA-E232-4D48-BC41-68AA11BE96C1}" presName="negativeSpace" presStyleCnt="0"/>
-      <dgm:spPr/>
-    </dgm:pt>
-    <dgm:pt modelId="{43E52892-A0BB-4B13-BD98-1445A1673215}" type="pres">
-      <dgm:prSet presAssocID="{F65930DA-E232-4D48-BC41-68AA11BE96C1}" presName="childText" presStyleLbl="conFgAcc1" presStyleIdx="1" presStyleCnt="3">
-        <dgm:presLayoutVars>
-          <dgm:bulletEnabled val="1"/>
-        </dgm:presLayoutVars>
-      </dgm:prSet>
-      <dgm:spPr/>
-      <dgm:t>
-        <a:bodyPr/>
-        <a:lstStyle/>
-        <a:p>
-          <a:endParaRPr lang="en-US"/>
-        </a:p>
-      </dgm:t>
-    </dgm:pt>
-    <dgm:pt modelId="{F7ACE25D-7BCD-4D33-92D1-EE646BF73A4D}" type="pres">
-      <dgm:prSet presAssocID="{D9BA9DE5-1A37-48F7-A230-5F507A75837B}" presName="spaceBetweenRectangles" presStyleCnt="0"/>
-      <dgm:spPr/>
-    </dgm:pt>
-    <dgm:pt modelId="{757630F4-7851-45EB-81BB-C9BDEC46394B}" type="pres">
-      <dgm:prSet presAssocID="{35774A53-64A3-45C8-892D-59E152D7C1B8}" presName="parentLin" presStyleCnt="0"/>
-      <dgm:spPr/>
-    </dgm:pt>
-    <dgm:pt modelId="{E4D96EA2-D7BC-4C14-BE7C-B4DF3A60D384}" type="pres">
-      <dgm:prSet presAssocID="{35774A53-64A3-45C8-892D-59E152D7C1B8}" presName="parentLeftMargin" presStyleLbl="node1" presStyleIdx="1" presStyleCnt="3"/>
-      <dgm:spPr/>
-      <dgm:t>
-        <a:bodyPr/>
-        <a:lstStyle/>
-        <a:p>
-          <a:endParaRPr lang="en-US"/>
-        </a:p>
-      </dgm:t>
-    </dgm:pt>
-    <dgm:pt modelId="{D8A0AA6B-15A5-4D08-AF1A-90185B5CB63D}" type="pres">
-      <dgm:prSet presAssocID="{35774A53-64A3-45C8-892D-59E152D7C1B8}" presName="parentText" presStyleLbl="node1" presStyleIdx="2" presStyleCnt="3">
-        <dgm:presLayoutVars>
-          <dgm:chMax val="0"/>
-          <dgm:bulletEnabled val="1"/>
-        </dgm:presLayoutVars>
-      </dgm:prSet>
-      <dgm:spPr/>
-      <dgm:t>
-        <a:bodyPr/>
-        <a:lstStyle/>
-        <a:p>
-          <a:endParaRPr lang="en-US"/>
-        </a:p>
-      </dgm:t>
     </dgm:pt>
     <dgm:pt modelId="{79305BED-0EF7-4A0C-8087-1B0583D7AF5E}" type="pres">
       <dgm:prSet presAssocID="{35774A53-64A3-45C8-892D-59E152D7C1B8}" presName="negativeSpace" presStyleCnt="0"/>
       <dgm:spPr/>
     </dgm:pt>
     <dgm:pt modelId="{ABAB945C-E61C-4046-9FE4-FAADCD57EDBB}" type="pres">
-      <dgm:prSet presAssocID="{35774A53-64A3-45C8-892D-59E152D7C1B8}" presName="childText" presStyleLbl="conFgAcc1" presStyleIdx="2" presStyleCnt="3">
+      <dgm:prSet presAssocID="{35774A53-64A3-45C8-892D-59E152D7C1B8}" presName="childText" presStyleLbl="conFgAcc1" presStyleIdx="1" presStyleCnt="2">
         <dgm:presLayoutVars>
           <dgm:bulletEnabled val="1"/>
         </dgm:presLayoutVars>
       </dgm:prSet>
       <dgm:spPr/>
-      <dgm:t>
-        <a:bodyPr/>
-        <a:lstStyle/>
-        <a:p>
-          <a:endParaRPr lang="en-US"/>
-        </a:p>
-      </dgm:t>
     </dgm:pt>
   </dgm:ptLst>
   <dgm:cxnLst>
-    <dgm:cxn modelId="{14EE0532-DCD6-4590-9A53-370AB7125691}" type="presOf" srcId="{F65930DA-E232-4D48-BC41-68AA11BE96C1}" destId="{378C3CF2-1E02-4B67-B80C-746CD23206DA}" srcOrd="0" destOrd="0" presId="urn:microsoft.com/office/officeart/2005/8/layout/list1"/>
-    <dgm:cxn modelId="{8C03F4CB-412E-4840-91C3-B650DB3913CC}" type="presOf" srcId="{35774A53-64A3-45C8-892D-59E152D7C1B8}" destId="{E4D96EA2-D7BC-4C14-BE7C-B4DF3A60D384}" srcOrd="0" destOrd="0" presId="urn:microsoft.com/office/officeart/2005/8/layout/list1"/>
-    <dgm:cxn modelId="{8BC256A6-14B5-429A-A23A-7E1072320718}" type="presOf" srcId="{ACB6571F-AC92-4D63-A4DF-AC6AD5F3B94A}" destId="{4FAF4BEA-61A1-4371-9026-17C75615DB12}" srcOrd="0" destOrd="0" presId="urn:microsoft.com/office/officeart/2005/8/layout/list1"/>
-    <dgm:cxn modelId="{04BA3818-7F33-4BAB-8F42-67D792AD1ADA}" srcId="{ACB6571F-AC92-4D63-A4DF-AC6AD5F3B94A}" destId="{35774A53-64A3-45C8-892D-59E152D7C1B8}" srcOrd="2" destOrd="0" parTransId="{32471045-F818-48AA-9A12-9627A6CE07E5}" sibTransId="{F7DE58E0-77D3-4857-A090-84A9EFBA691E}"/>
-    <dgm:cxn modelId="{75992516-A7EC-4E24-9D30-9BEECA67B0BE}" type="presOf" srcId="{F65930DA-E232-4D48-BC41-68AA11BE96C1}" destId="{208F2C27-868C-4547-9279-7C03FFBA9E60}" srcOrd="1" destOrd="0" presId="urn:microsoft.com/office/officeart/2005/8/layout/list1"/>
-    <dgm:cxn modelId="{5B23195A-3DE2-420C-8A81-FE91F4B1F0BA}" srcId="{ACB6571F-AC92-4D63-A4DF-AC6AD5F3B94A}" destId="{F65930DA-E232-4D48-BC41-68AA11BE96C1}" srcOrd="1" destOrd="0" parTransId="{3D0801E1-E736-4656-838C-743DC1DA6B27}" sibTransId="{D9BA9DE5-1A37-48F7-A230-5F507A75837B}"/>
+    <dgm:cxn modelId="{04BA3818-7F33-4BAB-8F42-67D792AD1ADA}" srcId="{ACB6571F-AC92-4D63-A4DF-AC6AD5F3B94A}" destId="{35774A53-64A3-45C8-892D-59E152D7C1B8}" srcOrd="1" destOrd="0" parTransId="{32471045-F818-48AA-9A12-9627A6CE07E5}" sibTransId="{F7DE58E0-77D3-4857-A090-84A9EFBA691E}"/>
     <dgm:cxn modelId="{2C343B20-EE29-4BE8-B56F-720C9CB891F0}" type="presOf" srcId="{C014E6F3-B358-4549-BD6C-83DF5ADDD954}" destId="{6680E501-C02D-414A-9C36-87B9F2458B9D}" srcOrd="0" destOrd="0" presId="urn:microsoft.com/office/officeart/2005/8/layout/list1"/>
     <dgm:cxn modelId="{75E68367-FF6B-4D99-A5A9-3FF8386D1FBF}" type="presOf" srcId="{35774A53-64A3-45C8-892D-59E152D7C1B8}" destId="{D8A0AA6B-15A5-4D08-AF1A-90185B5CB63D}" srcOrd="1" destOrd="0" presId="urn:microsoft.com/office/officeart/2005/8/layout/list1"/>
+    <dgm:cxn modelId="{8BC256A6-14B5-429A-A23A-7E1072320718}" type="presOf" srcId="{ACB6571F-AC92-4D63-A4DF-AC6AD5F3B94A}" destId="{4FAF4BEA-61A1-4371-9026-17C75615DB12}" srcOrd="0" destOrd="0" presId="urn:microsoft.com/office/officeart/2005/8/layout/list1"/>
+    <dgm:cxn modelId="{8C03F4CB-412E-4840-91C3-B650DB3913CC}" type="presOf" srcId="{35774A53-64A3-45C8-892D-59E152D7C1B8}" destId="{E4D96EA2-D7BC-4C14-BE7C-B4DF3A60D384}" srcOrd="0" destOrd="0" presId="urn:microsoft.com/office/officeart/2005/8/layout/list1"/>
     <dgm:cxn modelId="{EC1C5EFD-BB2E-4404-81D4-DFD6D62A04E7}" srcId="{ACB6571F-AC92-4D63-A4DF-AC6AD5F3B94A}" destId="{C014E6F3-B358-4549-BD6C-83DF5ADDD954}" srcOrd="0" destOrd="0" parTransId="{4182CEA6-78A8-42A8-A338-02774095F4E0}" sibTransId="{D271B80B-84B9-486E-A6C8-4D9B94362458}"/>
     <dgm:cxn modelId="{30CC39FE-D14D-4BD7-9D79-27791DA0FEDE}" type="presOf" srcId="{C014E6F3-B358-4549-BD6C-83DF5ADDD954}" destId="{4E6E6167-CAF6-4082-905D-B647E25B6FD2}" srcOrd="1" destOrd="0" presId="urn:microsoft.com/office/officeart/2005/8/layout/list1"/>
     <dgm:cxn modelId="{279FC65B-7245-430D-BC54-F8E1D593626F}" type="presParOf" srcId="{4FAF4BEA-61A1-4371-9026-17C75615DB12}" destId="{750888AB-AD9B-4B77-89E8-4D1460C909BA}" srcOrd="0" destOrd="0" presId="urn:microsoft.com/office/officeart/2005/8/layout/list1"/>
@@ -1286,17 +1153,11 @@
     <dgm:cxn modelId="{BCAF00B4-16A2-49FD-916F-ABED765B7C60}" type="presParOf" srcId="{4FAF4BEA-61A1-4371-9026-17C75615DB12}" destId="{4E0D1028-EFED-4A46-BC93-88B83439399C}" srcOrd="1" destOrd="0" presId="urn:microsoft.com/office/officeart/2005/8/layout/list1"/>
     <dgm:cxn modelId="{7A9B4CA2-DF1A-4A17-82D3-2A0BE506FD7A}" type="presParOf" srcId="{4FAF4BEA-61A1-4371-9026-17C75615DB12}" destId="{BDA7A0C6-B9F5-4C1F-A064-AA5D79140A7D}" srcOrd="2" destOrd="0" presId="urn:microsoft.com/office/officeart/2005/8/layout/list1"/>
     <dgm:cxn modelId="{170F8662-9E9D-4DF7-A5CB-4A922B6DB256}" type="presParOf" srcId="{4FAF4BEA-61A1-4371-9026-17C75615DB12}" destId="{16D09991-BD8D-4E32-84F6-00A132F7EFD0}" srcOrd="3" destOrd="0" presId="urn:microsoft.com/office/officeart/2005/8/layout/list1"/>
-    <dgm:cxn modelId="{83249A67-4186-4F67-8042-1B863EC83BCC}" type="presParOf" srcId="{4FAF4BEA-61A1-4371-9026-17C75615DB12}" destId="{20E3AAB7-F6FA-4D5E-A15F-33AB526983DC}" srcOrd="4" destOrd="0" presId="urn:microsoft.com/office/officeart/2005/8/layout/list1"/>
-    <dgm:cxn modelId="{CCB42C83-20F9-45C0-9482-D306A20E6066}" type="presParOf" srcId="{20E3AAB7-F6FA-4D5E-A15F-33AB526983DC}" destId="{378C3CF2-1E02-4B67-B80C-746CD23206DA}" srcOrd="0" destOrd="0" presId="urn:microsoft.com/office/officeart/2005/8/layout/list1"/>
-    <dgm:cxn modelId="{6A45237D-CA88-4822-BA45-C0A58D503EA6}" type="presParOf" srcId="{20E3AAB7-F6FA-4D5E-A15F-33AB526983DC}" destId="{208F2C27-868C-4547-9279-7C03FFBA9E60}" srcOrd="1" destOrd="0" presId="urn:microsoft.com/office/officeart/2005/8/layout/list1"/>
-    <dgm:cxn modelId="{8E61C041-0060-42E7-B6D2-95565095CF4C}" type="presParOf" srcId="{4FAF4BEA-61A1-4371-9026-17C75615DB12}" destId="{65CFDBB5-5D46-46F2-BEBC-9D7032FA8FFB}" srcOrd="5" destOrd="0" presId="urn:microsoft.com/office/officeart/2005/8/layout/list1"/>
-    <dgm:cxn modelId="{9D386BF6-0FF0-4040-8D39-19D57525EFF7}" type="presParOf" srcId="{4FAF4BEA-61A1-4371-9026-17C75615DB12}" destId="{43E52892-A0BB-4B13-BD98-1445A1673215}" srcOrd="6" destOrd="0" presId="urn:microsoft.com/office/officeart/2005/8/layout/list1"/>
-    <dgm:cxn modelId="{8D7CF429-6284-4377-A4BB-7ED2D4F43C43}" type="presParOf" srcId="{4FAF4BEA-61A1-4371-9026-17C75615DB12}" destId="{F7ACE25D-7BCD-4D33-92D1-EE646BF73A4D}" srcOrd="7" destOrd="0" presId="urn:microsoft.com/office/officeart/2005/8/layout/list1"/>
-    <dgm:cxn modelId="{E52B39B5-FA27-44E9-A7E9-CA67EFF8E826}" type="presParOf" srcId="{4FAF4BEA-61A1-4371-9026-17C75615DB12}" destId="{757630F4-7851-45EB-81BB-C9BDEC46394B}" srcOrd="8" destOrd="0" presId="urn:microsoft.com/office/officeart/2005/8/layout/list1"/>
+    <dgm:cxn modelId="{E52B39B5-FA27-44E9-A7E9-CA67EFF8E826}" type="presParOf" srcId="{4FAF4BEA-61A1-4371-9026-17C75615DB12}" destId="{757630F4-7851-45EB-81BB-C9BDEC46394B}" srcOrd="4" destOrd="0" presId="urn:microsoft.com/office/officeart/2005/8/layout/list1"/>
     <dgm:cxn modelId="{C4E00C68-C539-4BE2-9B2F-FC266F57120E}" type="presParOf" srcId="{757630F4-7851-45EB-81BB-C9BDEC46394B}" destId="{E4D96EA2-D7BC-4C14-BE7C-B4DF3A60D384}" srcOrd="0" destOrd="0" presId="urn:microsoft.com/office/officeart/2005/8/layout/list1"/>
     <dgm:cxn modelId="{74CE7558-50CB-4015-8AA5-729D9FE823F2}" type="presParOf" srcId="{757630F4-7851-45EB-81BB-C9BDEC46394B}" destId="{D8A0AA6B-15A5-4D08-AF1A-90185B5CB63D}" srcOrd="1" destOrd="0" presId="urn:microsoft.com/office/officeart/2005/8/layout/list1"/>
-    <dgm:cxn modelId="{40DF984C-3051-4893-9B1A-6ACAC9F7FD6D}" type="presParOf" srcId="{4FAF4BEA-61A1-4371-9026-17C75615DB12}" destId="{79305BED-0EF7-4A0C-8087-1B0583D7AF5E}" srcOrd="9" destOrd="0" presId="urn:microsoft.com/office/officeart/2005/8/layout/list1"/>
-    <dgm:cxn modelId="{882DDE72-703F-4616-8E7D-7840EB46158A}" type="presParOf" srcId="{4FAF4BEA-61A1-4371-9026-17C75615DB12}" destId="{ABAB945C-E61C-4046-9FE4-FAADCD57EDBB}" srcOrd="10" destOrd="0" presId="urn:microsoft.com/office/officeart/2005/8/layout/list1"/>
+    <dgm:cxn modelId="{40DF984C-3051-4893-9B1A-6ACAC9F7FD6D}" type="presParOf" srcId="{4FAF4BEA-61A1-4371-9026-17C75615DB12}" destId="{79305BED-0EF7-4A0C-8087-1B0583D7AF5E}" srcOrd="5" destOrd="0" presId="urn:microsoft.com/office/officeart/2005/8/layout/list1"/>
+    <dgm:cxn modelId="{882DDE72-703F-4616-8E7D-7840EB46158A}" type="presParOf" srcId="{4FAF4BEA-61A1-4371-9026-17C75615DB12}" destId="{ABAB945C-E61C-4046-9FE4-FAADCD57EDBB}" srcOrd="6" destOrd="0" presId="urn:microsoft.com/office/officeart/2005/8/layout/list1"/>
   </dgm:cxnLst>
   <dgm:bg/>
   <dgm:whole/>
@@ -1323,8 +1184,8 @@
       </dsp:nvSpPr>
       <dsp:spPr>
         <a:xfrm>
-          <a:off x="0" y="1074412"/>
-          <a:ext cx="6096000" cy="378000"/>
+          <a:off x="0" y="1333862"/>
+          <a:ext cx="7979664" cy="403200"/>
         </a:xfrm>
         <a:prstGeom prst="rect">
           <a:avLst/>
@@ -1372,8 +1233,8 @@
       </dsp:nvSpPr>
       <dsp:spPr>
         <a:xfrm>
-          <a:off x="304800" y="853012"/>
-          <a:ext cx="4267200" cy="442800"/>
+          <a:off x="398983" y="1097702"/>
+          <a:ext cx="5585764" cy="472320"/>
         </a:xfrm>
         <a:prstGeom prst="roundRect">
           <a:avLst/>
@@ -1415,12 +1276,12 @@
         </a:fontRef>
       </dsp:style>
       <dsp:txBody>
-        <a:bodyPr spcFirstLastPara="0" vert="horz" wrap="square" lIns="161290" tIns="0" rIns="161290" bIns="0" numCol="1" spcCol="1270" anchor="ctr" anchorCtr="0">
+        <a:bodyPr spcFirstLastPara="0" vert="horz" wrap="square" lIns="211129" tIns="0" rIns="211129" bIns="0" numCol="1" spcCol="1270" anchor="ctr" anchorCtr="0">
           <a:noAutofit/>
         </a:bodyPr>
         <a:lstStyle/>
         <a:p>
-          <a:pPr lvl="0" algn="l" defTabSz="666750">
+          <a:pPr marL="0" lvl="0" indent="0" algn="l" defTabSz="711200">
             <a:lnSpc>
               <a:spcPct val="90000"/>
             </a:lnSpc>
@@ -1430,144 +1291,17 @@
             <a:spcAft>
               <a:spcPct val="35000"/>
             </a:spcAft>
+            <a:buNone/>
           </a:pPr>
           <a:r>
-            <a:rPr lang="es-CR" sz="1500" b="1" kern="1200" noProof="0" dirty="0" smtClean="0"/>
-            <a:t>Introducción a Pruebas de rendimiento y Jmeter</a:t>
+            <a:rPr lang="es-CR" sz="1600" b="1" kern="1200" noProof="0" dirty="0"/>
+            <a:t>Introducción a Pruebas de rendimiento y Conceptos básicos</a:t>
           </a:r>
-          <a:endParaRPr lang="es-CR" sz="1500" b="1" kern="1200" noProof="0" dirty="0"/>
         </a:p>
       </dsp:txBody>
       <dsp:txXfrm>
-        <a:off x="326416" y="874628"/>
-        <a:ext cx="4223968" cy="399568"/>
-      </dsp:txXfrm>
-    </dsp:sp>
-    <dsp:sp modelId="{43E52892-A0BB-4B13-BD98-1445A1673215}">
-      <dsp:nvSpPr>
-        <dsp:cNvPr id="0" name=""/>
-        <dsp:cNvSpPr/>
-      </dsp:nvSpPr>
-      <dsp:spPr>
-        <a:xfrm>
-          <a:off x="0" y="1754813"/>
-          <a:ext cx="6096000" cy="378000"/>
-        </a:xfrm>
-        <a:prstGeom prst="rect">
-          <a:avLst/>
-        </a:prstGeom>
-        <a:solidFill>
-          <a:schemeClr val="dk2">
-            <a:alpha val="90000"/>
-            <a:tint val="40000"/>
-            <a:hueOff val="0"/>
-            <a:satOff val="0"/>
-            <a:lumOff val="0"/>
-            <a:alphaOff val="0"/>
-          </a:schemeClr>
-        </a:solidFill>
-        <a:ln w="25400" cap="flat" cmpd="sng" algn="ctr">
-          <a:solidFill>
-            <a:schemeClr val="dk2">
-              <a:hueOff val="0"/>
-              <a:satOff val="0"/>
-              <a:lumOff val="0"/>
-              <a:alphaOff val="0"/>
-            </a:schemeClr>
-          </a:solidFill>
-          <a:prstDash val="solid"/>
-        </a:ln>
-        <a:effectLst/>
-      </dsp:spPr>
-      <dsp:style>
-        <a:lnRef idx="2">
-          <a:scrgbClr r="0" g="0" b="0"/>
-        </a:lnRef>
-        <a:fillRef idx="1">
-          <a:scrgbClr r="0" g="0" b="0"/>
-        </a:fillRef>
-        <a:effectRef idx="0">
-          <a:scrgbClr r="0" g="0" b="0"/>
-        </a:effectRef>
-        <a:fontRef idx="minor"/>
-      </dsp:style>
-    </dsp:sp>
-    <dsp:sp modelId="{208F2C27-868C-4547-9279-7C03FFBA9E60}">
-      <dsp:nvSpPr>
-        <dsp:cNvPr id="0" name=""/>
-        <dsp:cNvSpPr/>
-      </dsp:nvSpPr>
-      <dsp:spPr>
-        <a:xfrm>
-          <a:off x="304800" y="1533412"/>
-          <a:ext cx="4267200" cy="442800"/>
-        </a:xfrm>
-        <a:prstGeom prst="roundRect">
-          <a:avLst/>
-        </a:prstGeom>
-        <a:solidFill>
-          <a:schemeClr val="lt1">
-            <a:hueOff val="0"/>
-            <a:satOff val="0"/>
-            <a:lumOff val="0"/>
-            <a:alphaOff val="0"/>
-          </a:schemeClr>
-        </a:solidFill>
-        <a:ln w="25400" cap="flat" cmpd="sng" algn="ctr">
-          <a:solidFill>
-            <a:schemeClr val="dk2">
-              <a:shade val="80000"/>
-              <a:hueOff val="0"/>
-              <a:satOff val="0"/>
-              <a:lumOff val="0"/>
-              <a:alphaOff val="0"/>
-            </a:schemeClr>
-          </a:solidFill>
-          <a:prstDash val="solid"/>
-        </a:ln>
-        <a:effectLst/>
-      </dsp:spPr>
-      <dsp:style>
-        <a:lnRef idx="2">
-          <a:scrgbClr r="0" g="0" b="0"/>
-        </a:lnRef>
-        <a:fillRef idx="1">
-          <a:scrgbClr r="0" g="0" b="0"/>
-        </a:fillRef>
-        <a:effectRef idx="0">
-          <a:scrgbClr r="0" g="0" b="0"/>
-        </a:effectRef>
-        <a:fontRef idx="minor">
-          <a:schemeClr val="lt1"/>
-        </a:fontRef>
-      </dsp:style>
-      <dsp:txBody>
-        <a:bodyPr spcFirstLastPara="0" vert="horz" wrap="square" lIns="161290" tIns="0" rIns="161290" bIns="0" numCol="1" spcCol="1270" anchor="ctr" anchorCtr="0">
-          <a:noAutofit/>
-        </a:bodyPr>
-        <a:lstStyle/>
-        <a:p>
-          <a:pPr lvl="0" algn="l" defTabSz="666750">
-            <a:lnSpc>
-              <a:spcPct val="90000"/>
-            </a:lnSpc>
-            <a:spcBef>
-              <a:spcPct val="0"/>
-            </a:spcBef>
-            <a:spcAft>
-              <a:spcPct val="35000"/>
-            </a:spcAft>
-          </a:pPr>
-          <a:r>
-            <a:rPr lang="es-CR" sz="1500" b="1" kern="1200" noProof="0" smtClean="0"/>
-            <a:t>Componentes básicos</a:t>
-          </a:r>
-          <a:endParaRPr lang="es-CR" sz="1500" b="1" kern="1200" noProof="0" dirty="0"/>
-        </a:p>
-      </dsp:txBody>
-      <dsp:txXfrm>
-        <a:off x="326416" y="1555028"/>
-        <a:ext cx="4223968" cy="399568"/>
+        <a:off x="422040" y="1120759"/>
+        <a:ext cx="5539650" cy="426206"/>
       </dsp:txXfrm>
     </dsp:sp>
     <dsp:sp modelId="{ABAB945C-E61C-4046-9FE4-FAADCD57EDBB}">
@@ -1577,8 +1311,8 @@
       </dsp:nvSpPr>
       <dsp:spPr>
         <a:xfrm>
-          <a:off x="0" y="2435213"/>
-          <a:ext cx="6096000" cy="378000"/>
+          <a:off x="0" y="2059622"/>
+          <a:ext cx="7979664" cy="403200"/>
         </a:xfrm>
         <a:prstGeom prst="rect">
           <a:avLst/>
@@ -1626,8 +1360,8 @@
       </dsp:nvSpPr>
       <dsp:spPr>
         <a:xfrm>
-          <a:off x="304800" y="2213813"/>
-          <a:ext cx="4267200" cy="442800"/>
+          <a:off x="398983" y="1823462"/>
+          <a:ext cx="5585764" cy="472320"/>
         </a:xfrm>
         <a:prstGeom prst="roundRect">
           <a:avLst/>
@@ -1669,12 +1403,12 @@
         </a:fontRef>
       </dsp:style>
       <dsp:txBody>
-        <a:bodyPr spcFirstLastPara="0" vert="horz" wrap="square" lIns="161290" tIns="0" rIns="161290" bIns="0" numCol="1" spcCol="1270" anchor="ctr" anchorCtr="0">
+        <a:bodyPr spcFirstLastPara="0" vert="horz" wrap="square" lIns="211129" tIns="0" rIns="211129" bIns="0" numCol="1" spcCol="1270" anchor="ctr" anchorCtr="0">
           <a:noAutofit/>
         </a:bodyPr>
         <a:lstStyle/>
         <a:p>
-          <a:pPr lvl="0" algn="l" defTabSz="666750">
+          <a:pPr marL="0" lvl="0" indent="0" algn="l" defTabSz="711200">
             <a:lnSpc>
               <a:spcPct val="90000"/>
             </a:lnSpc>
@@ -1684,17 +1418,17 @@
             <a:spcAft>
               <a:spcPct val="35000"/>
             </a:spcAft>
+            <a:buNone/>
           </a:pPr>
           <a:r>
-            <a:rPr lang="es-CR" sz="1500" b="1" kern="1200" noProof="0" dirty="0" smtClean="0"/>
-            <a:t>Práctica</a:t>
+            <a:rPr lang="es-CR" sz="1600" b="1" kern="1200" noProof="0" dirty="0"/>
+            <a:t>Introducción a Jmeter</a:t>
           </a:r>
-          <a:endParaRPr lang="es-CR" sz="1500" b="1" kern="1200" noProof="0" dirty="0"/>
         </a:p>
       </dsp:txBody>
       <dsp:txXfrm>
-        <a:off x="326416" y="2235429"/>
-        <a:ext cx="4223968" cy="399568"/>
+        <a:off x="422040" y="1846519"/>
+        <a:ext cx="5539650" cy="426206"/>
       </dsp:txXfrm>
     </dsp:sp>
   </dsp:spTree>
@@ -3043,7 +2777,7 @@
             <a:fld id="{F1D51F8A-A291-44B1-AD04-3C0621A81601}" type="datetimeFigureOut">
               <a:rPr lang="en-US" smtClean="0"/>
               <a:pPr/>
-              <a:t>11/14/2016</a:t>
+              <a:t>7/21/2017</a:t>
             </a:fld>
             <a:endParaRPr lang="en-US" dirty="0"/>
           </a:p>
@@ -3355,7 +3089,7 @@
         <p:spPr/>
         <p:txBody>
           <a:bodyPr>
-            <a:normAutofit fontScale="92500" lnSpcReduction="10000"/>
+            <a:normAutofit/>
           </a:bodyPr>
           <a:lstStyle/>
           <a:p>
@@ -3448,7 +3182,174 @@
           <a:bodyPr/>
           <a:lstStyle/>
           <a:p>
-            <a:endParaRPr lang="en-US"/>
+            <a:r>
+              <a:rPr lang="en-US" dirty="0" err="1"/>
+              <a:t>Responsividad</a:t>
+            </a:r>
+            <a:r>
+              <a:rPr lang="en-US" dirty="0"/>
+              <a:t> = </a:t>
+            </a:r>
+            <a:r>
+              <a:rPr lang="en-US" dirty="0" err="1"/>
+              <a:t>tiempos</a:t>
+            </a:r>
+            <a:r>
+              <a:rPr lang="en-US" dirty="0"/>
+              <a:t> de </a:t>
+            </a:r>
+            <a:r>
+              <a:rPr lang="en-US" dirty="0" err="1"/>
+              <a:t>respuesta</a:t>
+            </a:r>
+            <a:endParaRPr lang="en-US" dirty="0"/>
+          </a:p>
+          <a:p>
+            <a:r>
+              <a:rPr lang="en-US" dirty="0" err="1"/>
+              <a:t>Rendimiento</a:t>
+            </a:r>
+            <a:r>
+              <a:rPr lang="en-US" dirty="0"/>
+              <a:t> = </a:t>
+            </a:r>
+            <a:r>
+              <a:rPr lang="en-US" dirty="0" err="1"/>
+              <a:t>Cantidad</a:t>
+            </a:r>
+            <a:r>
+              <a:rPr lang="en-US" dirty="0"/>
+              <a:t> de </a:t>
+            </a:r>
+            <a:r>
+              <a:rPr lang="en-US" dirty="0" err="1"/>
+              <a:t>recursos</a:t>
+            </a:r>
+            <a:r>
+              <a:rPr lang="en-US" dirty="0"/>
+              <a:t> </a:t>
+            </a:r>
+            <a:r>
+              <a:rPr lang="en-US" dirty="0" err="1"/>
+              <a:t>utilizados</a:t>
+            </a:r>
+            <a:r>
+              <a:rPr lang="en-US" dirty="0"/>
+              <a:t> </a:t>
+            </a:r>
+          </a:p>
+          <a:p>
+            <a:r>
+              <a:rPr lang="en-US" dirty="0" err="1"/>
+              <a:t>Escalabilidad</a:t>
+            </a:r>
+            <a:r>
+              <a:rPr lang="en-US" dirty="0"/>
+              <a:t>  = </a:t>
+            </a:r>
+            <a:r>
+              <a:rPr lang="es-ES" sz="1200" b="0" i="0" kern="1200" dirty="0">
+                <a:solidFill>
+                  <a:schemeClr val="tx1"/>
+                </a:solidFill>
+                <a:effectLst/>
+                <a:latin typeface="+mn-lt"/>
+                <a:ea typeface="+mn-ea"/>
+                <a:cs typeface="+mn-cs"/>
+              </a:rPr>
+              <a:t>Propiedad de aumentar la capacidad de trabajo o de tamaño de un sistema sin comprometer el funcionamiento y calidad normales del mismo</a:t>
+            </a:r>
+            <a:endParaRPr lang="en-US" dirty="0"/>
+          </a:p>
+          <a:p>
+            <a:r>
+              <a:rPr lang="en-US" dirty="0" err="1"/>
+              <a:t>Confiabilidad</a:t>
+            </a:r>
+            <a:r>
+              <a:rPr lang="en-US" dirty="0"/>
+              <a:t> = </a:t>
+            </a:r>
+            <a:r>
+              <a:rPr lang="en-US" dirty="0" err="1"/>
+              <a:t>Capacidad</a:t>
+            </a:r>
+            <a:r>
+              <a:rPr lang="en-US" dirty="0"/>
+              <a:t> de un Sistema para </a:t>
+            </a:r>
+            <a:r>
+              <a:rPr lang="en-US" dirty="0" err="1"/>
+              <a:t>trabajar</a:t>
+            </a:r>
+            <a:r>
+              <a:rPr lang="en-US" dirty="0"/>
+              <a:t> </a:t>
+            </a:r>
+            <a:r>
+              <a:rPr lang="en-US" dirty="0" err="1"/>
+              <a:t>correctamente</a:t>
+            </a:r>
+            <a:r>
+              <a:rPr lang="en-US" dirty="0"/>
+              <a:t> bajo </a:t>
+            </a:r>
+            <a:r>
+              <a:rPr lang="en-US" dirty="0" err="1"/>
+              <a:t>una</a:t>
+            </a:r>
+            <a:r>
+              <a:rPr lang="en-US" dirty="0"/>
+              <a:t> </a:t>
+            </a:r>
+            <a:r>
+              <a:rPr lang="en-US" dirty="0" err="1"/>
+              <a:t>carga</a:t>
+            </a:r>
+            <a:r>
+              <a:rPr lang="en-US" dirty="0"/>
+              <a:t> de </a:t>
+            </a:r>
+            <a:r>
+              <a:rPr lang="en-US" dirty="0" err="1"/>
+              <a:t>trabajo</a:t>
+            </a:r>
+            <a:r>
+              <a:rPr lang="en-US" dirty="0"/>
+              <a:t> </a:t>
+            </a:r>
+            <a:r>
+              <a:rPr lang="en-US" dirty="0" err="1"/>
+              <a:t>definida</a:t>
+            </a:r>
+            <a:r>
+              <a:rPr lang="en-US" dirty="0"/>
+              <a:t> </a:t>
+            </a:r>
+            <a:r>
+              <a:rPr lang="en-US" dirty="0" err="1"/>
+              <a:t>durante</a:t>
+            </a:r>
+            <a:r>
+              <a:rPr lang="en-US" dirty="0"/>
+              <a:t> un </a:t>
+            </a:r>
+            <a:r>
+              <a:rPr lang="en-US" dirty="0" err="1"/>
+              <a:t>lapso</a:t>
+            </a:r>
+            <a:r>
+              <a:rPr lang="en-US" dirty="0"/>
+              <a:t> de </a:t>
+            </a:r>
+            <a:r>
+              <a:rPr lang="en-US" dirty="0" err="1"/>
+              <a:t>tiempo</a:t>
+            </a:r>
+            <a:r>
+              <a:rPr lang="en-US" dirty="0"/>
+              <a:t> dado </a:t>
+            </a:r>
           </a:p>
         </p:txBody>
       </p:sp>
@@ -3467,19 +3368,76 @@
           <a:bodyPr/>
           <a:lstStyle/>
           <a:p>
+            <a:pPr marL="0" marR="0" lvl="0" indent="0" algn="r" defTabSz="457200" rtl="0" eaLnBrk="1" fontAlgn="base" latinLnBrk="0" hangingPunct="1">
+              <a:lnSpc>
+                <a:spcPct val="100000"/>
+              </a:lnSpc>
+              <a:spcBef>
+                <a:spcPct val="0"/>
+              </a:spcBef>
+              <a:spcAft>
+                <a:spcPct val="0"/>
+              </a:spcAft>
+              <a:buClrTx/>
+              <a:buSzTx/>
+              <a:buFontTx/>
+              <a:buNone/>
+              <a:tabLst/>
+              <a:defRPr/>
+            </a:pPr>
             <a:fld id="{229149CE-2B6F-4C05-97EC-1BBE3517A066}" type="slidenum">
-              <a:rPr lang="en-US" smtClean="0"/>
-              <a:pPr/>
+              <a:rPr kumimoji="0" lang="en-US" sz="1200" b="0" i="0" u="none" strike="noStrike" kern="1200" cap="none" spc="0" normalizeH="0" baseline="0" noProof="0" smtClean="0">
+                <a:ln>
+                  <a:noFill/>
+                </a:ln>
+                <a:solidFill>
+                  <a:prstClr val="black"/>
+                </a:solidFill>
+                <a:effectLst/>
+                <a:uLnTx/>
+                <a:uFillTx/>
+                <a:latin typeface="Franklin Gothic Book" charset="0"/>
+                <a:ea typeface="ＭＳ Ｐゴシック" charset="0"/>
+              </a:rPr>
+              <a:pPr marL="0" marR="0" lvl="0" indent="0" algn="r" defTabSz="457200" rtl="0" eaLnBrk="1" fontAlgn="base" latinLnBrk="0" hangingPunct="1">
+                <a:lnSpc>
+                  <a:spcPct val="100000"/>
+                </a:lnSpc>
+                <a:spcBef>
+                  <a:spcPct val="0"/>
+                </a:spcBef>
+                <a:spcAft>
+                  <a:spcPct val="0"/>
+                </a:spcAft>
+                <a:buClrTx/>
+                <a:buSzTx/>
+                <a:buFontTx/>
+                <a:buNone/>
+                <a:tabLst/>
+                <a:defRPr/>
+              </a:pPr>
               <a:t>4</a:t>
             </a:fld>
-            <a:endParaRPr lang="en-US" dirty="0"/>
+            <a:endParaRPr kumimoji="0" lang="en-US" sz="1200" b="0" i="0" u="none" strike="noStrike" kern="1200" cap="none" spc="0" normalizeH="0" baseline="0" noProof="0" dirty="0">
+              <a:ln>
+                <a:noFill/>
+              </a:ln>
+              <a:solidFill>
+                <a:prstClr val="black"/>
+              </a:solidFill>
+              <a:effectLst/>
+              <a:uLnTx/>
+              <a:uFillTx/>
+              <a:latin typeface="Franklin Gothic Book" charset="0"/>
+              <a:ea typeface="ＭＳ Ｐゴシック" charset="0"/>
+            </a:endParaRPr>
           </a:p>
         </p:txBody>
       </p:sp>
     </p:spTree>
     <p:extLst>
       <p:ext uri="{BB962C8B-B14F-4D97-AF65-F5344CB8AC3E}">
-        <p14:creationId xmlns:p14="http://schemas.microsoft.com/office/powerpoint/2010/main" val="2751334569"/>
+        <p14:creationId xmlns:p14="http://schemas.microsoft.com/office/powerpoint/2010/main" val="518461839"/>
       </p:ext>
     </p:extLst>
   </p:cSld>
@@ -3530,8 +3488,192 @@
         </p:nvSpPr>
         <p:spPr/>
         <p:txBody>
-          <a:bodyPr/>
+          <a:bodyPr>
+            <a:normAutofit fontScale="92500" lnSpcReduction="20000"/>
+          </a:bodyPr>
           <a:lstStyle/>
+          <a:p>
+            <a:r>
+              <a:rPr lang="en-US" sz="1200" b="1" i="0" kern="1200" dirty="0">
+                <a:solidFill>
+                  <a:schemeClr val="tx1"/>
+                </a:solidFill>
+                <a:effectLst/>
+                <a:latin typeface="+mn-lt"/>
+                <a:ea typeface="+mn-ea"/>
+                <a:cs typeface="+mn-cs"/>
+              </a:rPr>
+              <a:t>Activity 1. Identify the Test Environment.</a:t>
+            </a:r>
+            <a:r>
+              <a:rPr lang="en-US" sz="1200" b="0" i="0" kern="1200" dirty="0">
+                <a:solidFill>
+                  <a:schemeClr val="tx1"/>
+                </a:solidFill>
+                <a:effectLst/>
+                <a:latin typeface="+mn-lt"/>
+                <a:ea typeface="+mn-ea"/>
+                <a:cs typeface="+mn-cs"/>
+              </a:rPr>
+              <a:t>  Identify the physical test environment and the production environment as well as the tools and resources available to the test team. The physical environment includes hardware, software, and network configurations. Having a thorough understanding of the entire test environment at the outset enables more efficient test design and planning and helps you identify testing challenges early in the project. In some situations, this process must be revisited periodically throughout the project’s life cycle.</a:t>
+            </a:r>
+          </a:p>
+          <a:p>
+            <a:r>
+              <a:rPr lang="en-US" sz="1200" b="1" i="0" kern="1200" dirty="0">
+                <a:solidFill>
+                  <a:schemeClr val="tx1"/>
+                </a:solidFill>
+                <a:effectLst/>
+                <a:latin typeface="+mn-lt"/>
+                <a:ea typeface="+mn-ea"/>
+                <a:cs typeface="+mn-cs"/>
+              </a:rPr>
+              <a:t>Activity 2. Identify Performance Acceptance Criteria.</a:t>
+            </a:r>
+            <a:r>
+              <a:rPr lang="en-US" sz="1200" b="0" i="0" kern="1200" dirty="0">
+                <a:solidFill>
+                  <a:schemeClr val="tx1"/>
+                </a:solidFill>
+                <a:effectLst/>
+                <a:latin typeface="+mn-lt"/>
+                <a:ea typeface="+mn-ea"/>
+                <a:cs typeface="+mn-cs"/>
+              </a:rPr>
+              <a:t>  Identify the response time, throughput, and resource utilization goals and constraints. In general, response time is a user concern, throughput is a business concern, and resource utilization is a system concern. Additionally, identify project success criteria that may not be captured by those goals and constraints; for example, using performance tests to evaluate what combination of configuration settings will result in the most desirable performance characteristics.</a:t>
+            </a:r>
+          </a:p>
+          <a:p>
+            <a:r>
+              <a:rPr lang="en-US" sz="1200" b="1" i="0" kern="1200" dirty="0">
+                <a:solidFill>
+                  <a:schemeClr val="tx1"/>
+                </a:solidFill>
+                <a:effectLst/>
+                <a:latin typeface="+mn-lt"/>
+                <a:ea typeface="+mn-ea"/>
+                <a:cs typeface="+mn-cs"/>
+              </a:rPr>
+              <a:t>Activity 3. Plan and Design Tests.</a:t>
+            </a:r>
+            <a:r>
+              <a:rPr lang="en-US" sz="1200" b="0" i="0" kern="1200" dirty="0">
+                <a:solidFill>
+                  <a:schemeClr val="tx1"/>
+                </a:solidFill>
+                <a:effectLst/>
+                <a:latin typeface="+mn-lt"/>
+                <a:ea typeface="+mn-ea"/>
+                <a:cs typeface="+mn-cs"/>
+              </a:rPr>
+              <a:t>  Identify key scenarios, determine variability among representative users and how to simulate that variability, define test data, and establish metrics to be collected. Consolidate this information into one or more models of system usage to be implemented, executed, and analyzed.   </a:t>
+            </a:r>
+          </a:p>
+          <a:p>
+            <a:r>
+              <a:rPr lang="en-US" sz="1200" b="1" i="0" kern="1200" dirty="0">
+                <a:solidFill>
+                  <a:schemeClr val="tx1"/>
+                </a:solidFill>
+                <a:effectLst/>
+                <a:latin typeface="+mn-lt"/>
+                <a:ea typeface="+mn-ea"/>
+                <a:cs typeface="+mn-cs"/>
+              </a:rPr>
+              <a:t>Activity 4. Configure the Test Environment.</a:t>
+            </a:r>
+            <a:r>
+              <a:rPr lang="en-US" sz="1200" b="0" i="0" kern="1200" dirty="0">
+                <a:solidFill>
+                  <a:schemeClr val="tx1"/>
+                </a:solidFill>
+                <a:effectLst/>
+                <a:latin typeface="+mn-lt"/>
+                <a:ea typeface="+mn-ea"/>
+                <a:cs typeface="+mn-cs"/>
+              </a:rPr>
+              <a:t>  Prepare the test environment, tools, and resources necessary to execute each strategy as features and components become available for test. Ensure that the test environment is instrumented for resource monitoring as necessary.</a:t>
+            </a:r>
+          </a:p>
+          <a:p>
+            <a:r>
+              <a:rPr lang="en-US" sz="1200" b="1" i="0" kern="1200" dirty="0">
+                <a:solidFill>
+                  <a:schemeClr val="tx1"/>
+                </a:solidFill>
+                <a:effectLst/>
+                <a:latin typeface="+mn-lt"/>
+                <a:ea typeface="+mn-ea"/>
+                <a:cs typeface="+mn-cs"/>
+              </a:rPr>
+              <a:t>Activity 5. Implement the Test Design.</a:t>
+            </a:r>
+            <a:r>
+              <a:rPr lang="en-US" sz="1200" b="0" i="0" kern="1200" dirty="0">
+                <a:solidFill>
+                  <a:schemeClr val="tx1"/>
+                </a:solidFill>
+                <a:effectLst/>
+                <a:latin typeface="+mn-lt"/>
+                <a:ea typeface="+mn-ea"/>
+                <a:cs typeface="+mn-cs"/>
+              </a:rPr>
+              <a:t>  Develop the performance tests in accordance with the test design.</a:t>
+            </a:r>
+          </a:p>
+          <a:p>
+            <a:r>
+              <a:rPr lang="en-US" sz="1200" b="1" i="0" kern="1200" dirty="0">
+                <a:solidFill>
+                  <a:schemeClr val="tx1"/>
+                </a:solidFill>
+                <a:effectLst/>
+                <a:latin typeface="+mn-lt"/>
+                <a:ea typeface="+mn-ea"/>
+                <a:cs typeface="+mn-cs"/>
+              </a:rPr>
+              <a:t>Activity 6. Execute the Test.</a:t>
+            </a:r>
+            <a:r>
+              <a:rPr lang="en-US" sz="1200" b="0" i="0" kern="1200" dirty="0">
+                <a:solidFill>
+                  <a:schemeClr val="tx1"/>
+                </a:solidFill>
+                <a:effectLst/>
+                <a:latin typeface="+mn-lt"/>
+                <a:ea typeface="+mn-ea"/>
+                <a:cs typeface="+mn-cs"/>
+              </a:rPr>
+              <a:t>  Run and monitor your tests. Validate the tests, test data, and results collection. Execute validated tests for analysis while monitoring the test and the test environment.</a:t>
+            </a:r>
+          </a:p>
+          <a:p>
+            <a:r>
+              <a:rPr lang="en-US" sz="1200" b="1" i="0" kern="1200" dirty="0">
+                <a:solidFill>
+                  <a:schemeClr val="tx1"/>
+                </a:solidFill>
+                <a:effectLst/>
+                <a:latin typeface="+mn-lt"/>
+                <a:ea typeface="+mn-ea"/>
+                <a:cs typeface="+mn-cs"/>
+              </a:rPr>
+              <a:t>Activity 7. Analyze Results, Report, and Retest.</a:t>
+            </a:r>
+            <a:r>
+              <a:rPr lang="en-US" sz="1200" b="0" i="0" kern="1200" dirty="0">
+                <a:solidFill>
+                  <a:schemeClr val="tx1"/>
+                </a:solidFill>
+                <a:effectLst/>
+                <a:latin typeface="+mn-lt"/>
+                <a:ea typeface="+mn-ea"/>
+                <a:cs typeface="+mn-cs"/>
+              </a:rPr>
+              <a:t>  Consolidate and share results data. Analyze the data both individually and as a cross-functional team. Reprioritize the remaining tests and re-execute them as needed. When all of the metric values are within accepted limits, none of the set thresholds have been violated, and all of the desired information has been collected, you have finished testing that particular scenario on that particular configuration.</a:t>
+            </a:r>
+          </a:p>
           <a:p>
             <a:pPr marL="0" marR="0" lvl="0" indent="0" algn="l" defTabSz="914400" rtl="0" eaLnBrk="1" fontAlgn="auto" latinLnBrk="0" hangingPunct="1">
               <a:lnSpc>
@@ -3550,64 +3692,6 @@
               <a:tabLst/>
               <a:defRPr/>
             </a:pPr>
-            <a:r>
-              <a:rPr lang="es-CR" sz="1200" dirty="0" smtClean="0">
-                <a:solidFill>
-                  <a:schemeClr val="bg1"/>
-                </a:solidFill>
-                <a:latin typeface="Futura Std Medium" charset="0"/>
-                <a:cs typeface="Futura Std Medium" charset="0"/>
-              </a:rPr>
-              <a:t>Mide el rendimiento</a:t>
-            </a:r>
-          </a:p>
-          <a:p>
-            <a:pPr marL="0" marR="0" lvl="0" indent="0" algn="l" defTabSz="914400" rtl="0" eaLnBrk="1" fontAlgn="auto" latinLnBrk="0" hangingPunct="1">
-              <a:lnSpc>
-                <a:spcPct val="100000"/>
-              </a:lnSpc>
-              <a:spcBef>
-                <a:spcPts val="0"/>
-              </a:spcBef>
-              <a:spcAft>
-                <a:spcPts val="0"/>
-              </a:spcAft>
-              <a:buClrTx/>
-              <a:buSzTx/>
-              <a:buFontTx/>
-              <a:buNone/>
-              <a:tabLst/>
-              <a:defRPr/>
-            </a:pPr>
-            <a:r>
-              <a:rPr lang="es-CR" sz="1200" dirty="0" smtClean="0">
-                <a:solidFill>
-                  <a:schemeClr val="bg1"/>
-                </a:solidFill>
-                <a:latin typeface="Futura Std Medium" charset="0"/>
-                <a:cs typeface="Futura Std Medium" charset="0"/>
-              </a:rPr>
-              <a:t>NO es un Navegador</a:t>
-            </a:r>
-            <a:endParaRPr lang="en-US" dirty="0" smtClean="0"/>
-          </a:p>
-          <a:p>
-            <a:r>
-              <a:rPr lang="es-CR" noProof="0" dirty="0" smtClean="0"/>
-              <a:t>-Aunque</a:t>
-            </a:r>
-            <a:r>
-              <a:rPr lang="en-US" dirty="0" smtClean="0"/>
-              <a:t> </a:t>
-            </a:r>
-            <a:r>
-              <a:rPr lang="es-CR" noProof="0" dirty="0" smtClean="0"/>
-              <a:t>parezca un navegador o múltiples navegadores</a:t>
-            </a:r>
-            <a:r>
-              <a:rPr lang="es-CR" baseline="0" noProof="0" dirty="0" smtClean="0"/>
-              <a:t>, Jmeter no ejecuta todas las acciones que soportan los navegadores. CSS</a:t>
-            </a:r>
             <a:endParaRPr lang="es-CR" noProof="0" dirty="0"/>
           </a:p>
         </p:txBody>
@@ -3712,10 +3796,152 @@
           <a:bodyPr/>
           <a:lstStyle/>
           <a:p>
+            <a:pPr marL="0" marR="0" lvl="0" indent="0" algn="r" defTabSz="457200" rtl="0" eaLnBrk="1" fontAlgn="base" latinLnBrk="0" hangingPunct="1">
+              <a:lnSpc>
+                <a:spcPct val="100000"/>
+              </a:lnSpc>
+              <a:spcBef>
+                <a:spcPct val="0"/>
+              </a:spcBef>
+              <a:spcAft>
+                <a:spcPct val="0"/>
+              </a:spcAft>
+              <a:buClrTx/>
+              <a:buSzTx/>
+              <a:buFontTx/>
+              <a:buNone/>
+              <a:tabLst/>
+              <a:defRPr/>
+            </a:pPr>
+            <a:fld id="{229149CE-2B6F-4C05-97EC-1BBE3517A066}" type="slidenum">
+              <a:rPr kumimoji="0" lang="en-US" sz="1200" b="0" i="0" u="none" strike="noStrike" kern="1200" cap="none" spc="0" normalizeH="0" baseline="0" noProof="0" smtClean="0">
+                <a:ln>
+                  <a:noFill/>
+                </a:ln>
+                <a:solidFill>
+                  <a:prstClr val="black"/>
+                </a:solidFill>
+                <a:effectLst/>
+                <a:uLnTx/>
+                <a:uFillTx/>
+                <a:latin typeface="Franklin Gothic Book" charset="0"/>
+                <a:ea typeface="ＭＳ Ｐゴシック" charset="0"/>
+              </a:rPr>
+              <a:pPr marL="0" marR="0" lvl="0" indent="0" algn="r" defTabSz="457200" rtl="0" eaLnBrk="1" fontAlgn="base" latinLnBrk="0" hangingPunct="1">
+                <a:lnSpc>
+                  <a:spcPct val="100000"/>
+                </a:lnSpc>
+                <a:spcBef>
+                  <a:spcPct val="0"/>
+                </a:spcBef>
+                <a:spcAft>
+                  <a:spcPct val="0"/>
+                </a:spcAft>
+                <a:buClrTx/>
+                <a:buSzTx/>
+                <a:buFontTx/>
+                <a:buNone/>
+                <a:tabLst/>
+                <a:defRPr/>
+              </a:pPr>
+              <a:t>6</a:t>
+            </a:fld>
+            <a:endParaRPr kumimoji="0" lang="en-US" sz="1200" b="0" i="0" u="none" strike="noStrike" kern="1200" cap="none" spc="0" normalizeH="0" baseline="0" noProof="0" dirty="0">
+              <a:ln>
+                <a:noFill/>
+              </a:ln>
+              <a:solidFill>
+                <a:prstClr val="black"/>
+              </a:solidFill>
+              <a:effectLst/>
+              <a:uLnTx/>
+              <a:uFillTx/>
+              <a:latin typeface="Franklin Gothic Book" charset="0"/>
+              <a:ea typeface="ＭＳ Ｐゴシック" charset="0"/>
+            </a:endParaRPr>
+          </a:p>
+        </p:txBody>
+      </p:sp>
+    </p:spTree>
+    <p:extLst>
+      <p:ext uri="{BB962C8B-B14F-4D97-AF65-F5344CB8AC3E}">
+        <p14:creationId xmlns:p14="http://schemas.microsoft.com/office/powerpoint/2010/main" val="1788697504"/>
+      </p:ext>
+    </p:extLst>
+  </p:cSld>
+  <p:clrMapOvr>
+    <a:masterClrMapping/>
+  </p:clrMapOvr>
+</p:notes>
+</file>
+
+<file path=ppt/notesSlides/notesSlide5.xml><?xml version="1.0" encoding="utf-8"?>
+<p:notes xmlns:a="http://schemas.openxmlformats.org/drawingml/2006/main" xmlns:r="http://schemas.openxmlformats.org/officeDocument/2006/relationships" xmlns:p="http://schemas.openxmlformats.org/presentationml/2006/main">
+  <p:cSld>
+    <p:spTree>
+      <p:nvGrpSpPr>
+        <p:cNvPr id="1" name=""/>
+        <p:cNvGrpSpPr/>
+        <p:nvPr/>
+      </p:nvGrpSpPr>
+      <p:grpSpPr>
+        <a:xfrm>
+          <a:off x="0" y="0"/>
+          <a:ext cx="0" cy="0"/>
+          <a:chOff x="0" y="0"/>
+          <a:chExt cx="0" cy="0"/>
+        </a:xfrm>
+      </p:grpSpPr>
+      <p:sp>
+        <p:nvSpPr>
+          <p:cNvPr id="2" name="Slide Image Placeholder 1"/>
+          <p:cNvSpPr>
+            <a:spLocks noGrp="1" noRot="1" noChangeAspect="1"/>
+          </p:cNvSpPr>
+          <p:nvPr>
+            <p:ph type="sldImg"/>
+          </p:nvPr>
+        </p:nvSpPr>
+        <p:spPr/>
+      </p:sp>
+      <p:sp>
+        <p:nvSpPr>
+          <p:cNvPr id="3" name="Notes Placeholder 2"/>
+          <p:cNvSpPr>
+            <a:spLocks noGrp="1"/>
+          </p:cNvSpPr>
+          <p:nvPr>
+            <p:ph type="body" idx="1"/>
+          </p:nvPr>
+        </p:nvSpPr>
+        <p:spPr/>
+        <p:txBody>
+          <a:bodyPr/>
+          <a:lstStyle/>
+          <a:p>
+            <a:endParaRPr lang="en-US" dirty="0"/>
+          </a:p>
+        </p:txBody>
+      </p:sp>
+      <p:sp>
+        <p:nvSpPr>
+          <p:cNvPr id="4" name="Slide Number Placeholder 3"/>
+          <p:cNvSpPr>
+            <a:spLocks noGrp="1"/>
+          </p:cNvSpPr>
+          <p:nvPr>
+            <p:ph type="sldNum" sz="quarter" idx="10"/>
+          </p:nvPr>
+        </p:nvSpPr>
+        <p:spPr/>
+        <p:txBody>
+          <a:bodyPr/>
+          <a:lstStyle/>
+          <a:p>
             <a:fld id="{229149CE-2B6F-4C05-97EC-1BBE3517A066}" type="slidenum">
               <a:rPr lang="en-US" smtClean="0"/>
               <a:pPr/>
-              <a:t>12</a:t>
+              <a:t>13</a:t>
             </a:fld>
             <a:endParaRPr lang="en-US" dirty="0"/>
           </a:p>
@@ -3921,7 +4147,7 @@
               <a:pPr>
                 <a:defRPr/>
               </a:pPr>
-              <a:t>11/14/2016</a:t>
+              <a:t>7/21/2017</a:t>
             </a:fld>
             <a:endParaRPr lang="en-US" dirty="0"/>
           </a:p>
@@ -4106,7 +4332,7 @@
               <a:pPr>
                 <a:defRPr/>
               </a:pPr>
-              <a:t>11/14/2016</a:t>
+              <a:t>7/21/2017</a:t>
             </a:fld>
             <a:endParaRPr lang="en-US" dirty="0"/>
           </a:p>
@@ -4301,7 +4527,7 @@
               <a:pPr>
                 <a:defRPr/>
               </a:pPr>
-              <a:t>11/14/2016</a:t>
+              <a:t>7/21/2017</a:t>
             </a:fld>
             <a:endParaRPr lang="en-US" dirty="0"/>
           </a:p>
@@ -4486,7 +4712,7 @@
               <a:pPr>
                 <a:defRPr/>
               </a:pPr>
-              <a:t>11/14/2016</a:t>
+              <a:t>7/21/2017</a:t>
             </a:fld>
             <a:endParaRPr lang="en-US" dirty="0"/>
           </a:p>
@@ -4747,7 +4973,7 @@
               <a:pPr>
                 <a:defRPr/>
               </a:pPr>
-              <a:t>11/14/2016</a:t>
+              <a:t>7/21/2017</a:t>
             </a:fld>
             <a:endParaRPr lang="en-US" dirty="0"/>
           </a:p>
@@ -5050,7 +5276,7 @@
               <a:pPr>
                 <a:defRPr/>
               </a:pPr>
-              <a:t>11/14/2016</a:t>
+              <a:t>7/21/2017</a:t>
             </a:fld>
             <a:endParaRPr lang="en-US" dirty="0"/>
           </a:p>
@@ -5487,7 +5713,7 @@
               <a:pPr>
                 <a:defRPr/>
               </a:pPr>
-              <a:t>11/14/2016</a:t>
+              <a:t>7/21/2017</a:t>
             </a:fld>
             <a:endParaRPr lang="en-US" dirty="0"/>
           </a:p>
@@ -5620,7 +5846,7 @@
               <a:pPr>
                 <a:defRPr/>
               </a:pPr>
-              <a:t>11/14/2016</a:t>
+              <a:t>7/21/2017</a:t>
             </a:fld>
             <a:endParaRPr lang="en-US" dirty="0"/>
           </a:p>
@@ -5730,7 +5956,7 @@
               <a:pPr>
                 <a:defRPr/>
               </a:pPr>
-              <a:t>11/14/2016</a:t>
+              <a:t>7/21/2017</a:t>
             </a:fld>
             <a:endParaRPr lang="en-US" dirty="0"/>
           </a:p>
@@ -6022,7 +6248,7 @@
               <a:pPr>
                 <a:defRPr/>
               </a:pPr>
-              <a:t>11/14/2016</a:t>
+              <a:t>7/21/2017</a:t>
             </a:fld>
             <a:endParaRPr lang="en-US" dirty="0"/>
           </a:p>
@@ -6290,7 +6516,7 @@
               <a:pPr>
                 <a:defRPr/>
               </a:pPr>
-              <a:t>11/14/2016</a:t>
+              <a:t>7/21/2017</a:t>
             </a:fld>
             <a:endParaRPr lang="en-US" dirty="0"/>
           </a:p>
@@ -6518,7 +6744,7 @@
               <a:pPr>
                 <a:defRPr/>
               </a:pPr>
-              <a:t>11/14/2016</a:t>
+              <a:t>7/21/2017</a:t>
             </a:fld>
             <a:endParaRPr lang="en-US" dirty="0"/>
           </a:p>
@@ -6942,7 +7168,7 @@
               <a:defRPr/>
             </a:pPr>
             <a:r>
-              <a:rPr lang="es-CR" sz="2400" dirty="0" smtClean="0">
+              <a:rPr lang="es-CR" sz="2400" dirty="0">
                 <a:solidFill>
                   <a:srgbClr val="FF4401"/>
                 </a:solidFill>
@@ -6952,7 +7178,7 @@
               <a:t>UNA – Capacitación Jmeter</a:t>
             </a:r>
             <a:br>
-              <a:rPr lang="es-CR" sz="2400" dirty="0" smtClean="0">
+              <a:rPr lang="es-CR" sz="2400" dirty="0">
                 <a:solidFill>
                   <a:srgbClr val="FF4401"/>
                 </a:solidFill>
@@ -6961,7 +7187,7 @@
               </a:rPr>
             </a:br>
             <a:r>
-              <a:rPr lang="es-CR" sz="2400" dirty="0" smtClean="0">
+              <a:rPr lang="es-CR" sz="2400" dirty="0">
                 <a:solidFill>
                   <a:srgbClr val="FF4401"/>
                 </a:solidFill>
@@ -6970,13 +7196,6 @@
               </a:rPr>
               <a:t>Sesión 1</a:t>
             </a:r>
-            <a:endParaRPr lang="es-CR" sz="2400" dirty="0">
-              <a:solidFill>
-                <a:srgbClr val="FF4401"/>
-              </a:solidFill>
-              <a:latin typeface="Futura Std Bold"/>
-              <a:cs typeface="Futura Std Bold"/>
-            </a:endParaRPr>
           </a:p>
         </p:txBody>
       </p:sp>
@@ -7018,7 +7237,7 @@
                 <a:latin typeface="Futura Std Heavy"/>
                 <a:cs typeface="Futura Std Heavy"/>
               </a:rPr>
-              <a:t>Noviembre</a:t>
+              <a:t>Julio</a:t>
             </a:r>
             <a:r>
               <a:rPr lang="en-US" dirty="0">
@@ -7028,7 +7247,7 @@
                 <a:latin typeface="Futura Std Heavy"/>
                 <a:cs typeface="Futura Std Heavy"/>
               </a:rPr>
-              <a:t> 2016</a:t>
+              <a:t> 2017</a:t>
             </a:r>
             <a:endParaRPr dirty="0">
               <a:solidFill>
@@ -7050,13 +7269,6 @@
   <p:clrMapOvr>
     <a:masterClrMapping/>
   </p:clrMapOvr>
-  <p:timing>
-    <p:tnLst>
-      <p:par>
-        <p:cTn id="1" dur="indefinite" restart="never" nodeType="tmRoot"/>
-      </p:par>
-    </p:tnLst>
-  </p:timing>
 </p:sld>
 </file>
 
@@ -7117,24 +7329,24 @@
               <a:defRPr/>
             </a:pPr>
             <a:r>
-              <a:rPr lang="es-CR" sz="3200" dirty="0" smtClean="0">
+              <a:rPr lang="es-CR" sz="3200" dirty="0">
                 <a:solidFill>
                   <a:srgbClr val="FF4401"/>
                 </a:solidFill>
                 <a:latin typeface="Futura Std Bold"/>
                 <a:cs typeface="Futura Std Bold"/>
               </a:rPr>
-              <a:t>HTTP </a:t>
-            </a:r>
-            <a:r>
-              <a:rPr lang="es-CR" sz="3200" dirty="0" err="1" smtClean="0">
+              <a:t>Test Script </a:t>
+            </a:r>
+            <a:r>
+              <a:rPr lang="es-CR" sz="3200" dirty="0" err="1">
                 <a:solidFill>
                   <a:srgbClr val="FF4401"/>
                 </a:solidFill>
                 <a:latin typeface="Futura Std Bold"/>
                 <a:cs typeface="Futura Std Bold"/>
               </a:rPr>
-              <a:t>Request</a:t>
+              <a:t>Recorder</a:t>
             </a:r>
             <a:endParaRPr lang="es-CR" sz="3200" dirty="0">
               <a:solidFill>
@@ -7180,20 +7392,13 @@
     </p:spTree>
     <p:extLst>
       <p:ext uri="{BB962C8B-B14F-4D97-AF65-F5344CB8AC3E}">
-        <p14:creationId xmlns:p14="http://schemas.microsoft.com/office/powerpoint/2010/main" val="3023506166"/>
+        <p14:creationId xmlns:p14="http://schemas.microsoft.com/office/powerpoint/2010/main" val="4103990552"/>
       </p:ext>
     </p:extLst>
   </p:cSld>
   <p:clrMapOvr>
     <a:masterClrMapping/>
   </p:clrMapOvr>
-  <p:timing>
-    <p:tnLst>
-      <p:par>
-        <p:cTn id="1" dur="indefinite" restart="never" nodeType="tmRoot"/>
-      </p:par>
-    </p:tnLst>
-  </p:timing>
 </p:sld>
 </file>
 
@@ -7254,7 +7459,137 @@
               <a:defRPr/>
             </a:pPr>
             <a:r>
-              <a:rPr lang="es-CR" sz="3200" dirty="0" smtClean="0">
+              <a:rPr lang="es-CR" sz="3200" dirty="0">
+                <a:solidFill>
+                  <a:srgbClr val="FF4401"/>
+                </a:solidFill>
+                <a:latin typeface="Futura Std Bold"/>
+                <a:cs typeface="Futura Std Bold"/>
+              </a:rPr>
+              <a:t>HTTP </a:t>
+            </a:r>
+            <a:r>
+              <a:rPr lang="es-CR" sz="3200" dirty="0" err="1">
+                <a:solidFill>
+                  <a:srgbClr val="FF4401"/>
+                </a:solidFill>
+                <a:latin typeface="Futura Std Bold"/>
+                <a:cs typeface="Futura Std Bold"/>
+              </a:rPr>
+              <a:t>Request</a:t>
+            </a:r>
+            <a:endParaRPr lang="es-CR" sz="3200" dirty="0">
+              <a:solidFill>
+                <a:srgbClr val="FF4401"/>
+              </a:solidFill>
+              <a:latin typeface="Futura Std Bold"/>
+              <a:ea typeface="+mj-ea"/>
+              <a:cs typeface="Futura Std Bold"/>
+            </a:endParaRPr>
+          </a:p>
+        </p:txBody>
+      </p:sp>
+      <p:sp>
+        <p:nvSpPr>
+          <p:cNvPr id="8195" name="Content Placeholder 2"/>
+          <p:cNvSpPr>
+            <a:spLocks noGrp="1"/>
+          </p:cNvSpPr>
+          <p:nvPr>
+            <p:ph idx="1"/>
+          </p:nvPr>
+        </p:nvSpPr>
+        <p:spPr>
+          <a:xfrm>
+            <a:off x="584200" y="1687513"/>
+            <a:ext cx="7759700" cy="2982912"/>
+          </a:xfrm>
+        </p:spPr>
+        <p:txBody>
+          <a:bodyPr/>
+          <a:lstStyle/>
+          <a:p>
+            <a:endParaRPr lang="es-CR" sz="2400" dirty="0">
+              <a:solidFill>
+                <a:schemeClr val="bg1"/>
+              </a:solidFill>
+              <a:latin typeface="Futura Std Medium" charset="0"/>
+              <a:cs typeface="Futura Std Medium" charset="0"/>
+            </a:endParaRPr>
+          </a:p>
+        </p:txBody>
+      </p:sp>
+    </p:spTree>
+    <p:extLst>
+      <p:ext uri="{BB962C8B-B14F-4D97-AF65-F5344CB8AC3E}">
+        <p14:creationId xmlns:p14="http://schemas.microsoft.com/office/powerpoint/2010/main" val="3023506166"/>
+      </p:ext>
+    </p:extLst>
+  </p:cSld>
+  <p:clrMapOvr>
+    <a:masterClrMapping/>
+  </p:clrMapOvr>
+</p:sld>
+</file>
+
+<file path=ppt/slides/slide12.xml><?xml version="1.0" encoding="utf-8"?>
+<p:sld xmlns:a="http://schemas.openxmlformats.org/drawingml/2006/main" xmlns:r="http://schemas.openxmlformats.org/officeDocument/2006/relationships" xmlns:p="http://schemas.openxmlformats.org/presentationml/2006/main">
+  <p:cSld>
+    <p:bg>
+      <p:bgPr>
+        <a:blipFill rotWithShape="1">
+          <a:blip r:embed="rId2"/>
+          <a:stretch>
+            <a:fillRect/>
+          </a:stretch>
+        </a:blipFill>
+        <a:effectLst/>
+      </p:bgPr>
+    </p:bg>
+    <p:spTree>
+      <p:nvGrpSpPr>
+        <p:cNvPr id="1" name=""/>
+        <p:cNvGrpSpPr/>
+        <p:nvPr/>
+      </p:nvGrpSpPr>
+      <p:grpSpPr>
+        <a:xfrm>
+          <a:off x="0" y="0"/>
+          <a:ext cx="0" cy="0"/>
+          <a:chOff x="0" y="0"/>
+          <a:chExt cx="0" cy="0"/>
+        </a:xfrm>
+      </p:grpSpPr>
+      <p:sp>
+        <p:nvSpPr>
+          <p:cNvPr id="2" name="Title 1"/>
+          <p:cNvSpPr>
+            <a:spLocks noGrp="1"/>
+          </p:cNvSpPr>
+          <p:nvPr>
+            <p:ph type="title"/>
+          </p:nvPr>
+        </p:nvSpPr>
+        <p:spPr>
+          <a:xfrm>
+            <a:off x="584200" y="618737"/>
+            <a:ext cx="7759700" cy="457200"/>
+          </a:xfrm>
+        </p:spPr>
+        <p:txBody>
+          <a:bodyPr>
+            <a:normAutofit fontScale="90000"/>
+          </a:bodyPr>
+          <a:lstStyle/>
+          <a:p>
+            <a:pPr algn="l" fontAlgn="auto">
+              <a:spcAft>
+                <a:spcPts val="0"/>
+              </a:spcAft>
+              <a:defRPr/>
+            </a:pPr>
+            <a:r>
+              <a:rPr lang="es-CR" sz="3200" dirty="0">
                 <a:solidFill>
                   <a:srgbClr val="FF4401"/>
                 </a:solidFill>
@@ -7264,7 +7599,7 @@
               <a:t>View </a:t>
             </a:r>
             <a:r>
-              <a:rPr lang="es-CR" sz="3200" dirty="0" err="1" smtClean="0">
+              <a:rPr lang="es-CR" sz="3200" dirty="0" err="1">
                 <a:solidFill>
                   <a:srgbClr val="FF4401"/>
                 </a:solidFill>
@@ -7274,7 +7609,7 @@
               <a:t>Results</a:t>
             </a:r>
             <a:r>
-              <a:rPr lang="es-CR" sz="3200" dirty="0" smtClean="0">
+              <a:rPr lang="es-CR" sz="3200" dirty="0">
                 <a:solidFill>
                   <a:srgbClr val="FF4401"/>
                 </a:solidFill>
@@ -7284,7 +7619,7 @@
               <a:t> </a:t>
             </a:r>
             <a:r>
-              <a:rPr lang="es-CR" sz="3200" dirty="0" err="1" smtClean="0">
+              <a:rPr lang="es-CR" sz="3200" dirty="0" err="1">
                 <a:solidFill>
                   <a:srgbClr val="FF4401"/>
                 </a:solidFill>
@@ -7344,17 +7679,10 @@
   <p:clrMapOvr>
     <a:masterClrMapping/>
   </p:clrMapOvr>
-  <p:timing>
-    <p:tnLst>
-      <p:par>
-        <p:cTn id="1" dur="indefinite" restart="never" nodeType="tmRoot"/>
-      </p:par>
-    </p:tnLst>
-  </p:timing>
 </p:sld>
 </file>
 
-<file path=ppt/slides/slide12.xml><?xml version="1.0" encoding="utf-8"?>
+<file path=ppt/slides/slide13.xml><?xml version="1.0" encoding="utf-8"?>
 <p:sld xmlns:a="http://schemas.openxmlformats.org/drawingml/2006/main" xmlns:r="http://schemas.openxmlformats.org/officeDocument/2006/relationships" xmlns:p="http://schemas.openxmlformats.org/presentationml/2006/main">
   <p:cSld>
     <p:bg>
@@ -7411,7 +7739,7 @@
               <a:defRPr/>
             </a:pPr>
             <a:r>
-              <a:rPr lang="es-CR" sz="2400" dirty="0" smtClean="0">
+              <a:rPr lang="es-CR" sz="2400" dirty="0">
                 <a:solidFill>
                   <a:srgbClr val="FF4401"/>
                 </a:solidFill>
@@ -7421,14 +7749,6 @@
               </a:rPr>
               <a:t>Práctica</a:t>
             </a:r>
-            <a:endParaRPr lang="es-CR" sz="2400" dirty="0">
-              <a:solidFill>
-                <a:srgbClr val="FF4401"/>
-              </a:solidFill>
-              <a:latin typeface="Futura Std Bold"/>
-              <a:ea typeface="+mj-ea"/>
-              <a:cs typeface="Futura Std Bold"/>
-            </a:endParaRPr>
           </a:p>
         </p:txBody>
       </p:sp>
@@ -7467,13 +7787,6 @@
               </a:rPr>
               <a:t>UNA – Capacitación Jmeter</a:t>
             </a:r>
-            <a:endParaRPr lang="es-CR" dirty="0">
-              <a:solidFill>
-                <a:schemeClr val="bg1"/>
-              </a:solidFill>
-              <a:latin typeface="Futura Std Heavy"/>
-              <a:cs typeface="Futura Std Heavy"/>
-            </a:endParaRPr>
           </a:p>
         </p:txBody>
       </p:sp>
@@ -7487,17 +7800,10 @@
   <p:clrMapOvr>
     <a:masterClrMapping/>
   </p:clrMapOvr>
-  <p:timing>
-    <p:tnLst>
-      <p:par>
-        <p:cTn id="1" dur="indefinite" restart="never" nodeType="tmRoot"/>
-      </p:par>
-    </p:tnLst>
-  </p:timing>
 </p:sld>
 </file>
 
-<file path=ppt/slides/slide13.xml><?xml version="1.0" encoding="utf-8"?>
+<file path=ppt/slides/slide14.xml><?xml version="1.0" encoding="utf-8"?>
 <p:sld xmlns:a="http://schemas.openxmlformats.org/drawingml/2006/main" xmlns:r="http://schemas.openxmlformats.org/officeDocument/2006/relationships" xmlns:p="http://schemas.openxmlformats.org/presentationml/2006/main">
   <p:cSld>
     <p:bg>
@@ -7577,13 +7883,6 @@
   <p:clrMapOvr>
     <a:masterClrMapping/>
   </p:clrMapOvr>
-  <p:timing>
-    <p:tnLst>
-      <p:par>
-        <p:cTn id="1" dur="indefinite" restart="never" nodeType="tmRoot"/>
-      </p:par>
-    </p:tnLst>
-  </p:timing>
 </p:sld>
 </file>
 
@@ -7671,14 +7970,14 @@
           <p:nvPr>
             <p:extLst>
               <p:ext uri="{D42A27DB-BD31-4B8C-83A1-F6EECF244321}">
-                <p14:modId xmlns:p14="http://schemas.microsoft.com/office/powerpoint/2010/main" val="3317170727"/>
+                <p14:modId xmlns:p14="http://schemas.microsoft.com/office/powerpoint/2010/main" val="2081921435"/>
               </p:ext>
             </p:extLst>
           </p:nvPr>
         </p:nvGraphicFramePr>
         <p:xfrm>
-          <a:off x="1524000" y="1406106"/>
-          <a:ext cx="6096000" cy="3666226"/>
+          <a:off x="457200" y="1511808"/>
+          <a:ext cx="7979664" cy="3560524"/>
         </p:xfrm>
         <a:graphic>
           <a:graphicData uri="http://schemas.openxmlformats.org/drawingml/2006/diagram">
@@ -7691,13 +7990,6 @@
   <p:clrMapOvr>
     <a:masterClrMapping/>
   </p:clrMapOvr>
-  <p:timing>
-    <p:tnLst>
-      <p:par>
-        <p:cTn id="1" dur="indefinite" restart="never" nodeType="tmRoot"/>
-      </p:par>
-    </p:tnLst>
-  </p:timing>
 </p:sld>
 </file>
 
@@ -7747,7 +8039,7 @@
         </p:spPr>
         <p:txBody>
           <a:bodyPr>
-            <a:normAutofit/>
+            <a:normAutofit fontScale="90000"/>
           </a:bodyPr>
           <a:lstStyle/>
           <a:p>
@@ -7758,16 +8050,32 @@
               <a:defRPr/>
             </a:pPr>
             <a:r>
-              <a:rPr lang="es-CR" sz="2400" dirty="0">
+              <a:rPr lang="es-ES" sz="2400" dirty="0">
                 <a:solidFill>
                   <a:srgbClr val="FF4401"/>
                 </a:solidFill>
                 <a:latin typeface="Futura Std Bold"/>
-                <a:ea typeface="+mj-ea"/>
                 <a:cs typeface="Futura Std Bold"/>
               </a:rPr>
-              <a:t>Introducción</a:t>
-            </a:r>
+              <a:t>Introducción a Pruebas de rendimiento y Conceptos básicos</a:t>
+            </a:r>
+            <a:br>
+              <a:rPr lang="es-ES" sz="2400" dirty="0">
+                <a:solidFill>
+                  <a:srgbClr val="FF4401"/>
+                </a:solidFill>
+                <a:latin typeface="Futura Std Bold"/>
+                <a:cs typeface="Futura Std Bold"/>
+              </a:rPr>
+            </a:br>
+            <a:endParaRPr lang="es-CR" sz="2400" dirty="0">
+              <a:solidFill>
+                <a:srgbClr val="FF4401"/>
+              </a:solidFill>
+              <a:latin typeface="Futura Std Bold"/>
+              <a:ea typeface="+mj-ea"/>
+              <a:cs typeface="Futura Std Bold"/>
+            </a:endParaRPr>
           </a:p>
         </p:txBody>
       </p:sp>
@@ -7802,7 +8110,7 @@
               <a:defRPr/>
             </a:pPr>
             <a:r>
-              <a:rPr lang="es-CR" dirty="0" smtClean="0">
+              <a:rPr lang="es-CR" dirty="0">
                 <a:solidFill>
                   <a:schemeClr val="bg1"/>
                 </a:solidFill>
@@ -7811,13 +8119,6 @@
               </a:rPr>
               <a:t>UNA – Capacitación Jmeter</a:t>
             </a:r>
-            <a:endParaRPr lang="es-CR" dirty="0">
-              <a:solidFill>
-                <a:schemeClr val="bg1"/>
-              </a:solidFill>
-              <a:latin typeface="Futura Std Heavy"/>
-              <a:cs typeface="Futura Std Heavy"/>
-            </a:endParaRPr>
           </a:p>
         </p:txBody>
       </p:sp>
@@ -7831,13 +8132,6 @@
   <p:clrMapOvr>
     <a:masterClrMapping/>
   </p:clrMapOvr>
-  <p:timing>
-    <p:tnLst>
-      <p:par>
-        <p:cTn id="1" dur="indefinite" restart="never" nodeType="tmRoot"/>
-      </p:par>
-    </p:tnLst>
-  </p:timing>
 </p:sld>
 </file>
 
@@ -7898,14 +8192,14 @@
               <a:defRPr/>
             </a:pPr>
             <a:r>
-              <a:rPr lang="es-CR" sz="3200" dirty="0" smtClean="0">
+              <a:rPr lang="es-CR" sz="3200" dirty="0">
                 <a:solidFill>
                   <a:srgbClr val="FF4401"/>
                 </a:solidFill>
                 <a:latin typeface="Futura Std Bold"/>
                 <a:cs typeface="Futura Std Bold"/>
               </a:rPr>
-              <a:t>Pruebas de Rendimiento</a:t>
+              <a:t>Qué es una prueba de rendimiento?</a:t>
             </a:r>
             <a:endParaRPr lang="es-CR" sz="3200" dirty="0">
               <a:solidFill>
@@ -7939,57 +8233,17 @@
           <a:lstStyle/>
           <a:p>
             <a:r>
-              <a:rPr lang="es-CR" sz="2400" dirty="0" smtClean="0">
+              <a:rPr lang="es-CR" sz="2400" dirty="0">
                 <a:solidFill>
                   <a:schemeClr val="bg1"/>
                 </a:solidFill>
                 <a:latin typeface="Futura Std Medium" charset="0"/>
                 <a:cs typeface="Futura Std Medium" charset="0"/>
               </a:rPr>
-              <a:t>Rendimiento</a:t>
-            </a:r>
-          </a:p>
-          <a:p>
-            <a:endParaRPr lang="es-CR" sz="2400" dirty="0" smtClean="0">
-              <a:solidFill>
-                <a:schemeClr val="bg1"/>
-              </a:solidFill>
-              <a:latin typeface="Futura Std Medium" charset="0"/>
-              <a:cs typeface="Futura Std Medium" charset="0"/>
-            </a:endParaRPr>
-          </a:p>
-          <a:p>
-            <a:r>
-              <a:rPr lang="es-CR" sz="2400" dirty="0" smtClean="0">
-                <a:solidFill>
-                  <a:schemeClr val="bg1"/>
-                </a:solidFill>
-                <a:latin typeface="Futura Std Medium" charset="0"/>
-                <a:cs typeface="Futura Std Medium" charset="0"/>
-              </a:rPr>
-              <a:t>Carga</a:t>
-            </a:r>
-          </a:p>
-          <a:p>
-            <a:endParaRPr lang="es-CR" sz="2400" dirty="0" smtClean="0">
-              <a:solidFill>
-                <a:schemeClr val="bg1"/>
-              </a:solidFill>
-              <a:latin typeface="Futura Std Medium" charset="0"/>
-              <a:cs typeface="Futura Std Medium" charset="0"/>
-            </a:endParaRPr>
-          </a:p>
-          <a:p>
-            <a:r>
-              <a:rPr lang="es-CR" sz="2400" dirty="0" smtClean="0">
-                <a:solidFill>
-                  <a:schemeClr val="bg1"/>
-                </a:solidFill>
-                <a:latin typeface="Futura Std Medium" charset="0"/>
-                <a:cs typeface="Futura Std Medium" charset="0"/>
-              </a:rPr>
-              <a:t>Estrés</a:t>
-            </a:r>
+              <a:t>Es un tipo de prueba NO funcional</a:t>
+            </a:r>
+          </a:p>
+          <a:p>
             <a:endParaRPr lang="es-CR" sz="2400" dirty="0">
               <a:solidFill>
                 <a:schemeClr val="bg1"/>
@@ -7998,25 +8252,50 @@
               <a:cs typeface="Futura Std Medium" charset="0"/>
             </a:endParaRPr>
           </a:p>
+          <a:p>
+            <a:r>
+              <a:rPr lang="es-CR" sz="2400" dirty="0">
+                <a:solidFill>
+                  <a:schemeClr val="bg1"/>
+                </a:solidFill>
+                <a:latin typeface="Futura Std Medium" charset="0"/>
+                <a:cs typeface="Futura Std Medium" charset="0"/>
+              </a:rPr>
+              <a:t>Determina </a:t>
+            </a:r>
+            <a:r>
+              <a:rPr lang="es-CR" sz="2400" dirty="0" err="1">
+                <a:solidFill>
+                  <a:schemeClr val="bg1"/>
+                </a:solidFill>
+                <a:latin typeface="Futura Std Medium" charset="0"/>
+                <a:cs typeface="Futura Std Medium" charset="0"/>
+              </a:rPr>
+              <a:t>responsividad</a:t>
+            </a:r>
+            <a:r>
+              <a:rPr lang="es-CR" sz="2400" dirty="0">
+                <a:solidFill>
+                  <a:schemeClr val="bg1"/>
+                </a:solidFill>
+                <a:latin typeface="Futura Std Medium" charset="0"/>
+                <a:cs typeface="Futura Std Medium" charset="0"/>
+              </a:rPr>
+              <a:t>, rendimiento, confiabilidad y escalabilidad bajo una carga de trabajo dada</a:t>
+            </a:r>
+          </a:p>
         </p:txBody>
       </p:sp>
     </p:spTree>
     <p:extLst>
       <p:ext uri="{BB962C8B-B14F-4D97-AF65-F5344CB8AC3E}">
-        <p14:creationId xmlns:p14="http://schemas.microsoft.com/office/powerpoint/2010/main" val="1632316597"/>
+        <p14:creationId xmlns:p14="http://schemas.microsoft.com/office/powerpoint/2010/main" val="2689780702"/>
       </p:ext>
     </p:extLst>
   </p:cSld>
   <p:clrMapOvr>
     <a:masterClrMapping/>
   </p:clrMapOvr>
-  <p:timing>
-    <p:tnLst>
-      <p:par>
-        <p:cTn id="1" dur="indefinite" restart="never" nodeType="tmRoot"/>
-      </p:par>
-    </p:tnLst>
-  </p:timing>
 </p:sld>
 </file>
 
@@ -8077,14 +8356,14 @@
               <a:defRPr/>
             </a:pPr>
             <a:r>
-              <a:rPr lang="es-CR" sz="3200" dirty="0" smtClean="0">
+              <a:rPr lang="es-CR" sz="3200" dirty="0">
                 <a:solidFill>
                   <a:srgbClr val="FF4401"/>
                 </a:solidFill>
                 <a:latin typeface="Futura Std Bold"/>
                 <a:cs typeface="Futura Std Bold"/>
               </a:rPr>
-              <a:t>Jmeter</a:t>
+              <a:t>Proceso de una prueba de Rendimiento</a:t>
             </a:r>
             <a:endParaRPr lang="es-CR" sz="3200" dirty="0">
               <a:solidFill>
@@ -8114,70 +8393,121 @@
           </a:xfrm>
         </p:spPr>
         <p:txBody>
-          <a:bodyPr/>
+          <a:bodyPr>
+            <a:normAutofit fontScale="92500"/>
+          </a:bodyPr>
           <a:lstStyle/>
           <a:p>
-            <a:r>
-              <a:rPr lang="es-CR" sz="2400" dirty="0" smtClean="0">
+            <a:pPr marL="457200" indent="-457200">
+              <a:buFont typeface="+mj-lt"/>
+              <a:buAutoNum type="arabicPeriod"/>
+            </a:pPr>
+            <a:r>
+              <a:rPr lang="es-CR" sz="2400" dirty="0">
                 <a:solidFill>
                   <a:schemeClr val="bg1"/>
                 </a:solidFill>
                 <a:latin typeface="Futura Std Medium" charset="0"/>
                 <a:cs typeface="Futura Std Medium" charset="0"/>
               </a:rPr>
-              <a:t>Mide el rendimiento</a:t>
-            </a:r>
-          </a:p>
-          <a:p>
-            <a:endParaRPr lang="es-CR" sz="2400" dirty="0">
-              <a:solidFill>
-                <a:schemeClr val="bg1"/>
-              </a:solidFill>
-              <a:latin typeface="Futura Std Medium" charset="0"/>
-              <a:cs typeface="Futura Std Medium" charset="0"/>
-            </a:endParaRPr>
-          </a:p>
-          <a:p>
-            <a:r>
-              <a:rPr lang="es-CR" sz="2400" dirty="0" smtClean="0">
+              <a:t>Identificar el ambiente de pruebas</a:t>
+            </a:r>
+          </a:p>
+          <a:p>
+            <a:pPr marL="457200" indent="-457200">
+              <a:buFont typeface="+mj-lt"/>
+              <a:buAutoNum type="arabicPeriod"/>
+            </a:pPr>
+            <a:r>
+              <a:rPr lang="es-CR" sz="2400" dirty="0">
                 <a:solidFill>
                   <a:schemeClr val="bg1"/>
                 </a:solidFill>
                 <a:latin typeface="Futura Std Medium" charset="0"/>
                 <a:cs typeface="Futura Std Medium" charset="0"/>
               </a:rPr>
-              <a:t>No es un navegador</a:t>
-            </a:r>
-          </a:p>
-          <a:p>
-            <a:endParaRPr lang="es-CR" sz="2400" dirty="0">
-              <a:solidFill>
-                <a:schemeClr val="bg1"/>
-              </a:solidFill>
-              <a:latin typeface="Futura Std Medium" charset="0"/>
-              <a:cs typeface="Futura Std Medium" charset="0"/>
-            </a:endParaRPr>
-          </a:p>
-          <a:p>
-            <a:r>
-              <a:rPr lang="es-CR" sz="2400" dirty="0" smtClean="0">
+              <a:t>Identificar el criterio de aceptación del rendimiento</a:t>
+            </a:r>
+          </a:p>
+          <a:p>
+            <a:pPr marL="457200" indent="-457200">
+              <a:buFont typeface="+mj-lt"/>
+              <a:buAutoNum type="arabicPeriod"/>
+            </a:pPr>
+            <a:r>
+              <a:rPr lang="es-CR" sz="2400" dirty="0">
                 <a:solidFill>
                   <a:schemeClr val="bg1"/>
                 </a:solidFill>
                 <a:latin typeface="Futura Std Medium" charset="0"/>
                 <a:cs typeface="Futura Std Medium" charset="0"/>
               </a:rPr>
-              <a:t>No es para realizar pruebas funcionales</a:t>
-            </a:r>
-          </a:p>
-          <a:p>
-            <a:endParaRPr lang="es-CR" sz="2400" dirty="0">
-              <a:solidFill>
-                <a:schemeClr val="bg1"/>
-              </a:solidFill>
-              <a:latin typeface="Futura Std Medium" charset="0"/>
-              <a:cs typeface="Futura Std Medium" charset="0"/>
-            </a:endParaRPr>
+              <a:t>Planear y diseñar las pruebas</a:t>
+            </a:r>
+          </a:p>
+          <a:p>
+            <a:pPr marL="457200" indent="-457200">
+              <a:buFont typeface="+mj-lt"/>
+              <a:buAutoNum type="arabicPeriod"/>
+            </a:pPr>
+            <a:r>
+              <a:rPr lang="es-CR" sz="2400" dirty="0">
+                <a:solidFill>
+                  <a:schemeClr val="bg1"/>
+                </a:solidFill>
+                <a:latin typeface="Futura Std Medium" charset="0"/>
+                <a:cs typeface="Futura Std Medium" charset="0"/>
+              </a:rPr>
+              <a:t>Configurar el ambiente de pruebas</a:t>
+            </a:r>
+          </a:p>
+          <a:p>
+            <a:pPr marL="457200" indent="-457200">
+              <a:buFont typeface="+mj-lt"/>
+              <a:buAutoNum type="arabicPeriod"/>
+            </a:pPr>
+            <a:r>
+              <a:rPr lang="es-CR" sz="2400" dirty="0">
+                <a:solidFill>
+                  <a:schemeClr val="bg1"/>
+                </a:solidFill>
+                <a:latin typeface="Futura Std Medium" charset="0"/>
+                <a:cs typeface="Futura Std Medium" charset="0"/>
+              </a:rPr>
+              <a:t>Implementar el diseño de pruebas</a:t>
+            </a:r>
+          </a:p>
+          <a:p>
+            <a:pPr marL="457200" indent="-457200">
+              <a:buFont typeface="+mj-lt"/>
+              <a:buAutoNum type="arabicPeriod"/>
+            </a:pPr>
+            <a:r>
+              <a:rPr lang="es-CR" sz="2400" dirty="0">
+                <a:solidFill>
+                  <a:schemeClr val="bg1"/>
+                </a:solidFill>
+                <a:latin typeface="Futura Std Medium" charset="0"/>
+                <a:cs typeface="Futura Std Medium" charset="0"/>
+              </a:rPr>
+              <a:t>Ejecutar la prueba</a:t>
+            </a:r>
+          </a:p>
+          <a:p>
+            <a:pPr marL="457200" indent="-457200">
+              <a:buFont typeface="+mj-lt"/>
+              <a:buAutoNum type="arabicPeriod"/>
+            </a:pPr>
+            <a:r>
+              <a:rPr lang="es-CR" sz="2400" dirty="0">
+                <a:solidFill>
+                  <a:schemeClr val="bg1"/>
+                </a:solidFill>
+                <a:latin typeface="Futura Std Medium" charset="0"/>
+                <a:cs typeface="Futura Std Medium" charset="0"/>
+              </a:rPr>
+              <a:t>Análisis de resultados, reportes</a:t>
+            </a:r>
           </a:p>
           <a:p>
             <a:endParaRPr lang="es-CR" sz="2400" dirty="0">
@@ -8200,13 +8530,6 @@
   <p:clrMapOvr>
     <a:masterClrMapping/>
   </p:clrMapOvr>
-  <p:timing>
-    <p:tnLst>
-      <p:par>
-        <p:cTn id="1" dur="indefinite" restart="never" nodeType="tmRoot"/>
-      </p:par>
-    </p:tnLst>
-  </p:timing>
 </p:sld>
 </file>
 
@@ -8216,7 +8539,7 @@
     <p:bg>
       <p:bgPr>
         <a:blipFill rotWithShape="1">
-          <a:blip r:embed="rId2"/>
+          <a:blip r:embed="rId3"/>
           <a:stretch>
             <a:fillRect/>
           </a:stretch>
@@ -8245,18 +8568,18 @@
             <a:spLocks noGrp="1"/>
           </p:cNvSpPr>
           <p:nvPr>
-            <p:ph type="ctrTitle"/>
+            <p:ph type="title"/>
           </p:nvPr>
         </p:nvSpPr>
         <p:spPr>
           <a:xfrm>
-            <a:off x="228600" y="2463800"/>
-            <a:ext cx="4579938" cy="533400"/>
+            <a:off x="584200" y="618737"/>
+            <a:ext cx="7759700" cy="457200"/>
           </a:xfrm>
         </p:spPr>
         <p:txBody>
           <a:bodyPr>
-            <a:normAutofit/>
+            <a:normAutofit fontScale="90000"/>
           </a:bodyPr>
           <a:lstStyle/>
           <a:p>
@@ -8267,17 +8590,16 @@
               <a:defRPr/>
             </a:pPr>
             <a:r>
-              <a:rPr lang="es-CR" sz="2400" dirty="0" smtClean="0">
+              <a:rPr lang="es-CR" sz="3200" dirty="0">
                 <a:solidFill>
                   <a:srgbClr val="FF4401"/>
                 </a:solidFill>
                 <a:latin typeface="Futura Std Bold"/>
-                <a:ea typeface="+mj-ea"/>
                 <a:cs typeface="Futura Std Bold"/>
               </a:rPr>
-              <a:t>Componentes básicos</a:t>
-            </a:r>
-            <a:endParaRPr lang="es-CR" sz="2400" dirty="0">
+              <a:t>Tipos de pruebas</a:t>
+            </a:r>
+            <a:endParaRPr lang="es-CR" sz="3200" dirty="0">
               <a:solidFill>
                 <a:srgbClr val="FF4401"/>
               </a:solidFill>
@@ -8290,45 +8612,66 @@
       </p:sp>
       <p:sp>
         <p:nvSpPr>
-          <p:cNvPr id="6" name="Subtitle 2"/>
-          <p:cNvSpPr>
-            <a:spLocks noGrp="1"/>
-          </p:cNvSpPr>
-          <p:nvPr>
-            <p:ph type="subTitle" idx="1"/>
+          <p:cNvPr id="8195" name="Content Placeholder 2"/>
+          <p:cNvSpPr>
+            <a:spLocks noGrp="1"/>
+          </p:cNvSpPr>
+          <p:nvPr>
+            <p:ph idx="1"/>
           </p:nvPr>
         </p:nvSpPr>
         <p:spPr>
           <a:xfrm>
-            <a:off x="228600" y="3238500"/>
-            <a:ext cx="3987800" cy="284163"/>
+            <a:off x="584200" y="1687513"/>
+            <a:ext cx="7759700" cy="2982912"/>
           </a:xfrm>
         </p:spPr>
         <p:txBody>
-          <a:bodyPr rtlCol="0">
-            <a:normAutofit fontScale="47500" lnSpcReduction="20000"/>
-          </a:bodyPr>
+          <a:bodyPr/>
           <a:lstStyle/>
           <a:p>
-            <a:pPr algn="l">
-              <a:defRPr/>
-            </a:pPr>
-            <a:r>
-              <a:rPr lang="es-CR" dirty="0">
+            <a:r>
+              <a:rPr lang="es-CR" sz="2400" dirty="0">
                 <a:solidFill>
                   <a:schemeClr val="bg1"/>
                 </a:solidFill>
-                <a:latin typeface="Futura Std Heavy"/>
-                <a:cs typeface="Futura Std Heavy"/>
+                <a:latin typeface="Futura Std Medium" charset="0"/>
+                <a:cs typeface="Futura Std Medium" charset="0"/>
               </a:rPr>
-              <a:t>UNA – Capacitación Jmeter</a:t>
-            </a:r>
-            <a:endParaRPr lang="es-CR" dirty="0">
+              <a:t>Carga</a:t>
+            </a:r>
+          </a:p>
+          <a:p>
+            <a:r>
+              <a:rPr lang="es-CR" sz="2400" dirty="0">
+                <a:solidFill>
+                  <a:schemeClr val="bg1"/>
+                </a:solidFill>
+                <a:latin typeface="Futura Std Medium" charset="0"/>
+                <a:cs typeface="Futura Std Medium" charset="0"/>
+              </a:rPr>
+              <a:t>Estrés</a:t>
+            </a:r>
+          </a:p>
+          <a:p>
+            <a:r>
+              <a:rPr lang="es-CR" sz="2400" dirty="0">
+                <a:solidFill>
+                  <a:schemeClr val="bg1"/>
+                </a:solidFill>
+                <a:latin typeface="Futura Std Medium" charset="0"/>
+                <a:cs typeface="Futura Std Medium" charset="0"/>
+              </a:rPr>
+              <a:t>Capacidad</a:t>
+            </a:r>
+          </a:p>
+          <a:p>
+            <a:endParaRPr lang="es-CR" sz="2400" dirty="0">
               <a:solidFill>
                 <a:schemeClr val="bg1"/>
               </a:solidFill>
-              <a:latin typeface="Futura Std Heavy"/>
-              <a:cs typeface="Futura Std Heavy"/>
+              <a:latin typeface="Futura Std Medium" charset="0"/>
+              <a:cs typeface="Futura Std Medium" charset="0"/>
             </a:endParaRPr>
           </a:p>
         </p:txBody>
@@ -8336,20 +8679,13 @@
     </p:spTree>
     <p:extLst>
       <p:ext uri="{BB962C8B-B14F-4D97-AF65-F5344CB8AC3E}">
-        <p14:creationId xmlns:p14="http://schemas.microsoft.com/office/powerpoint/2010/main" val="253837798"/>
+        <p14:creationId xmlns:p14="http://schemas.microsoft.com/office/powerpoint/2010/main" val="1703856938"/>
       </p:ext>
     </p:extLst>
   </p:cSld>
   <p:clrMapOvr>
     <a:masterClrMapping/>
   </p:clrMapOvr>
-  <p:timing>
-    <p:tnLst>
-      <p:par>
-        <p:cTn id="1" dur="indefinite" restart="never" nodeType="tmRoot"/>
-      </p:par>
-    </p:tnLst>
-  </p:timing>
 </p:sld>
 </file>
 
@@ -8388,18 +8724,18 @@
             <a:spLocks noGrp="1"/>
           </p:cNvSpPr>
           <p:nvPr>
-            <p:ph type="title"/>
+            <p:ph type="ctrTitle"/>
           </p:nvPr>
         </p:nvSpPr>
         <p:spPr>
           <a:xfrm>
-            <a:off x="584200" y="618737"/>
-            <a:ext cx="7759700" cy="457200"/>
+            <a:off x="228600" y="2463800"/>
+            <a:ext cx="4579938" cy="533400"/>
           </a:xfrm>
         </p:spPr>
         <p:txBody>
           <a:bodyPr>
-            <a:normAutofit fontScale="90000"/>
+            <a:normAutofit/>
           </a:bodyPr>
           <a:lstStyle/>
           <a:p>
@@ -8410,103 +8746,67 @@
               <a:defRPr/>
             </a:pPr>
             <a:r>
-              <a:rPr lang="es-CR" sz="3200" dirty="0" err="1" smtClean="0">
+              <a:rPr lang="es-CR" sz="2400" dirty="0">
                 <a:solidFill>
                   <a:srgbClr val="FF4401"/>
                 </a:solidFill>
                 <a:latin typeface="Futura Std Bold"/>
+                <a:ea typeface="+mj-ea"/>
                 <a:cs typeface="Futura Std Bold"/>
               </a:rPr>
-              <a:t>Thread</a:t>
-            </a:r>
-            <a:r>
-              <a:rPr lang="es-CR" sz="3200" dirty="0" smtClean="0">
-                <a:solidFill>
-                  <a:srgbClr val="FF4401"/>
-                </a:solidFill>
-                <a:latin typeface="Futura Std Bold"/>
-                <a:cs typeface="Futura Std Bold"/>
-              </a:rPr>
-              <a:t> </a:t>
-            </a:r>
-            <a:r>
-              <a:rPr lang="es-CR" sz="3200" dirty="0" err="1">
-                <a:solidFill>
-                  <a:srgbClr val="FF4401"/>
-                </a:solidFill>
-                <a:latin typeface="Futura Std Bold"/>
-                <a:cs typeface="Futura Std Bold"/>
-              </a:rPr>
-              <a:t>G</a:t>
-            </a:r>
-            <a:r>
-              <a:rPr lang="es-CR" sz="3200" dirty="0" err="1" smtClean="0">
-                <a:solidFill>
-                  <a:srgbClr val="FF4401"/>
-                </a:solidFill>
-                <a:latin typeface="Futura Std Bold"/>
-                <a:cs typeface="Futura Std Bold"/>
-              </a:rPr>
-              <a:t>roup</a:t>
-            </a:r>
-            <a:endParaRPr lang="es-CR" sz="3200" dirty="0">
-              <a:solidFill>
-                <a:srgbClr val="FF4401"/>
-              </a:solidFill>
-              <a:latin typeface="Futura Std Bold"/>
-              <a:ea typeface="+mj-ea"/>
-              <a:cs typeface="Futura Std Bold"/>
-            </a:endParaRPr>
-          </a:p>
-        </p:txBody>
-      </p:sp>
-      <p:sp>
-        <p:nvSpPr>
-          <p:cNvPr id="8195" name="Content Placeholder 2"/>
-          <p:cNvSpPr>
-            <a:spLocks noGrp="1"/>
-          </p:cNvSpPr>
-          <p:nvPr>
-            <p:ph idx="1"/>
+              <a:t>Componentes básicos</a:t>
+            </a:r>
+          </a:p>
+        </p:txBody>
+      </p:sp>
+      <p:sp>
+        <p:nvSpPr>
+          <p:cNvPr id="6" name="Subtitle 2"/>
+          <p:cNvSpPr>
+            <a:spLocks noGrp="1"/>
+          </p:cNvSpPr>
+          <p:nvPr>
+            <p:ph type="subTitle" idx="1"/>
           </p:nvPr>
         </p:nvSpPr>
         <p:spPr>
           <a:xfrm>
-            <a:off x="584200" y="1687513"/>
-            <a:ext cx="7759700" cy="2982912"/>
+            <a:off x="228600" y="3238500"/>
+            <a:ext cx="3987800" cy="284163"/>
           </a:xfrm>
         </p:spPr>
         <p:txBody>
-          <a:bodyPr/>
+          <a:bodyPr rtlCol="0">
+            <a:normAutofit fontScale="47500" lnSpcReduction="20000"/>
+          </a:bodyPr>
           <a:lstStyle/>
           <a:p>
-            <a:endParaRPr lang="es-CR" sz="2400" dirty="0">
-              <a:solidFill>
-                <a:schemeClr val="bg1"/>
-              </a:solidFill>
-              <a:latin typeface="Futura Std Medium" charset="0"/>
-              <a:cs typeface="Futura Std Medium" charset="0"/>
-            </a:endParaRPr>
+            <a:pPr algn="l">
+              <a:defRPr/>
+            </a:pPr>
+            <a:r>
+              <a:rPr lang="es-CR" dirty="0">
+                <a:solidFill>
+                  <a:schemeClr val="bg1"/>
+                </a:solidFill>
+                <a:latin typeface="Futura Std Heavy"/>
+                <a:cs typeface="Futura Std Heavy"/>
+              </a:rPr>
+              <a:t>UNA – Capacitación Jmeter</a:t>
+            </a:r>
           </a:p>
         </p:txBody>
       </p:sp>
     </p:spTree>
     <p:extLst>
       <p:ext uri="{BB962C8B-B14F-4D97-AF65-F5344CB8AC3E}">
-        <p14:creationId xmlns:p14="http://schemas.microsoft.com/office/powerpoint/2010/main" val="636171528"/>
+        <p14:creationId xmlns:p14="http://schemas.microsoft.com/office/powerpoint/2010/main" val="253837798"/>
       </p:ext>
     </p:extLst>
   </p:cSld>
   <p:clrMapOvr>
     <a:masterClrMapping/>
   </p:clrMapOvr>
-  <p:timing>
-    <p:tnLst>
-      <p:par>
-        <p:cTn id="1" dur="indefinite" restart="never" nodeType="tmRoot"/>
-      </p:par>
-    </p:tnLst>
-  </p:timing>
 </p:sld>
 </file>
 
@@ -8567,14 +8867,34 @@
               <a:defRPr/>
             </a:pPr>
             <a:r>
-              <a:rPr lang="es-CR" sz="3200" dirty="0" smtClean="0">
+              <a:rPr lang="es-CR" sz="3200" dirty="0" err="1">
                 <a:solidFill>
                   <a:srgbClr val="FF4401"/>
                 </a:solidFill>
                 <a:latin typeface="Futura Std Bold"/>
                 <a:cs typeface="Futura Std Bold"/>
               </a:rPr>
-              <a:t>Simple &amp; Recording Controller</a:t>
+              <a:t>Thread</a:t>
+            </a:r>
+            <a:r>
+              <a:rPr lang="es-CR" sz="3200" dirty="0">
+                <a:solidFill>
+                  <a:srgbClr val="FF4401"/>
+                </a:solidFill>
+                <a:latin typeface="Futura Std Bold"/>
+                <a:cs typeface="Futura Std Bold"/>
+              </a:rPr>
+              <a:t> </a:t>
+            </a:r>
+            <a:r>
+              <a:rPr lang="es-CR" sz="3200" dirty="0" err="1">
+                <a:solidFill>
+                  <a:srgbClr val="FF4401"/>
+                </a:solidFill>
+                <a:latin typeface="Futura Std Bold"/>
+                <a:cs typeface="Futura Std Bold"/>
+              </a:rPr>
+              <a:t>Group</a:t>
             </a:r>
             <a:endParaRPr lang="es-CR" sz="3200" dirty="0">
               <a:solidFill>
@@ -8620,20 +8940,13 @@
     </p:spTree>
     <p:extLst>
       <p:ext uri="{BB962C8B-B14F-4D97-AF65-F5344CB8AC3E}">
-        <p14:creationId xmlns:p14="http://schemas.microsoft.com/office/powerpoint/2010/main" val="846625321"/>
+        <p14:creationId xmlns:p14="http://schemas.microsoft.com/office/powerpoint/2010/main" val="636171528"/>
       </p:ext>
     </p:extLst>
   </p:cSld>
   <p:clrMapOvr>
     <a:masterClrMapping/>
   </p:clrMapOvr>
-  <p:timing>
-    <p:tnLst>
-      <p:par>
-        <p:cTn id="1" dur="indefinite" restart="never" nodeType="tmRoot"/>
-      </p:par>
-    </p:tnLst>
-  </p:timing>
 </p:sld>
 </file>
 
@@ -8694,24 +9007,14 @@
               <a:defRPr/>
             </a:pPr>
             <a:r>
-              <a:rPr lang="es-CR" sz="3200" dirty="0" smtClean="0">
+              <a:rPr lang="es-CR" sz="3200" dirty="0">
                 <a:solidFill>
                   <a:srgbClr val="FF4401"/>
                 </a:solidFill>
                 <a:latin typeface="Futura Std Bold"/>
                 <a:cs typeface="Futura Std Bold"/>
               </a:rPr>
-              <a:t>Test Script </a:t>
-            </a:r>
-            <a:r>
-              <a:rPr lang="es-CR" sz="3200" dirty="0" err="1" smtClean="0">
-                <a:solidFill>
-                  <a:srgbClr val="FF4401"/>
-                </a:solidFill>
-                <a:latin typeface="Futura Std Bold"/>
-                <a:cs typeface="Futura Std Bold"/>
-              </a:rPr>
-              <a:t>Recorder</a:t>
+              <a:t>Simple &amp; Recording Controller</a:t>
             </a:r>
             <a:endParaRPr lang="es-CR" sz="3200" dirty="0">
               <a:solidFill>
@@ -8757,20 +9060,13 @@
     </p:spTree>
     <p:extLst>
       <p:ext uri="{BB962C8B-B14F-4D97-AF65-F5344CB8AC3E}">
-        <p14:creationId xmlns:p14="http://schemas.microsoft.com/office/powerpoint/2010/main" val="4103990552"/>
+        <p14:creationId xmlns:p14="http://schemas.microsoft.com/office/powerpoint/2010/main" val="846625321"/>
       </p:ext>
     </p:extLst>
   </p:cSld>
   <p:clrMapOvr>
     <a:masterClrMapping/>
   </p:clrMapOvr>
-  <p:timing>
-    <p:tnLst>
-      <p:par>
-        <p:cTn id="1" dur="indefinite" restart="never" nodeType="tmRoot"/>
-      </p:par>
-    </p:tnLst>
-  </p:timing>
 </p:sld>
 </file>
 
@@ -9387,6 +9683,15 @@
 </file>
 
 <file path=customXml/item2.xml><?xml version="1.0" encoding="utf-8"?>
+<p:properties xmlns:p="http://schemas.microsoft.com/office/2006/metadata/properties" xmlns:xsi="http://www.w3.org/2001/XMLSchema-instance" xmlns:pc="http://schemas.microsoft.com/office/infopath/2007/PartnerControls">
+  <documentManagement>
+    <_Version xmlns="http://schemas.microsoft.com/sharepoint/v3/fields" xsi:nil="true"/>
+    <_Status xmlns="http://schemas.microsoft.com/sharepoint/v3/fields">Not Started</_Status>
+  </documentManagement>
+</p:properties>
+</file>
+
+<file path=customXml/item3.xml><?xml version="1.0" encoding="utf-8"?>
 <ct:contentTypeSchema xmlns:ct="http://schemas.microsoft.com/office/2006/metadata/contentType" xmlns:ma="http://schemas.microsoft.com/office/2006/metadata/properties/metaAttributes" ct:_="" ma:_="" ma:contentTypeName="Document" ma:contentTypeID="0x0101000DE64AEEDD9B7A4D93545ACBE97D4615" ma:contentTypeVersion="2" ma:contentTypeDescription="Create a new document." ma:contentTypeScope="" ma:versionID="f49002b78e3a4a71b814eef46a983816">
   <xsd:schema xmlns:xsd="http://www.w3.org/2001/XMLSchema" xmlns:xs="http://www.w3.org/2001/XMLSchema" xmlns:p="http://schemas.microsoft.com/office/2006/metadata/properties" xmlns:ns2="http://schemas.microsoft.com/sharepoint/v3/fields" targetNamespace="http://schemas.microsoft.com/office/2006/metadata/properties" ma:root="true" ma:fieldsID="38f6db2dd0d9a0cf6a8dc37be32b365b" ns2:_="">
     <xsd:import namespace="http://schemas.microsoft.com/sharepoint/v3/fields"/>
@@ -9530,15 +9835,6 @@
 </ct:contentTypeSchema>
 </file>
 
-<file path=customXml/item3.xml><?xml version="1.0" encoding="utf-8"?>
-<p:properties xmlns:p="http://schemas.microsoft.com/office/2006/metadata/properties" xmlns:xsi="http://www.w3.org/2001/XMLSchema-instance" xmlns:pc="http://schemas.microsoft.com/office/infopath/2007/PartnerControls">
-  <documentManagement>
-    <_Version xmlns="http://schemas.microsoft.com/sharepoint/v3/fields" xsi:nil="true"/>
-    <_Status xmlns="http://schemas.microsoft.com/sharepoint/v3/fields">Not Started</_Status>
-  </documentManagement>
-</p:properties>
-</file>
-
 <file path=customXml/itemProps1.xml><?xml version="1.0" encoding="utf-8"?>
 <ds:datastoreItem xmlns:ds="http://schemas.openxmlformats.org/officeDocument/2006/customXml" ds:itemID="{87D2A1B0-FF3E-4009-940D-AED0EB70AA20}">
   <ds:schemaRefs>
@@ -9548,6 +9844,22 @@
 </file>
 
 <file path=customXml/itemProps2.xml><?xml version="1.0" encoding="utf-8"?>
+<ds:datastoreItem xmlns:ds="http://schemas.openxmlformats.org/officeDocument/2006/customXml" ds:itemID="{7B6F2769-7194-4217-93D3-3AF3A4742282}">
+  <ds:schemaRefs>
+    <ds:schemaRef ds:uri="http://schemas.microsoft.com/office/2006/metadata/properties"/>
+    <ds:schemaRef ds:uri="http://purl.org/dc/dcmitype/"/>
+    <ds:schemaRef ds:uri="http://schemas.microsoft.com/office/2006/documentManagement/types"/>
+    <ds:schemaRef ds:uri="http://purl.org/dc/terms/"/>
+    <ds:schemaRef ds:uri="http://schemas.microsoft.com/office/infopath/2007/PartnerControls"/>
+    <ds:schemaRef ds:uri="http://purl.org/dc/elements/1.1/"/>
+    <ds:schemaRef ds:uri="http://schemas.openxmlformats.org/package/2006/metadata/core-properties"/>
+    <ds:schemaRef ds:uri="http://schemas.microsoft.com/sharepoint/v3/fields"/>
+    <ds:schemaRef ds:uri="http://www.w3.org/XML/1998/namespace"/>
+  </ds:schemaRefs>
+</ds:datastoreItem>
+</file>
+
+<file path=customXml/itemProps3.xml><?xml version="1.0" encoding="utf-8"?>
 <ds:datastoreItem xmlns:ds="http://schemas.openxmlformats.org/officeDocument/2006/customXml" ds:itemID="{E4214858-785C-42F7-BE66-6D0E79395FC8}">
   <ds:schemaRefs>
     <ds:schemaRef ds:uri="http://schemas.microsoft.com/office/2006/metadata/contentType"/>
@@ -9563,20 +9875,4 @@
     <ds:schemaRef ds:uri="http://schemas.microsoft.com/internal/obd"/>
   </ds:schemaRefs>
 </ds:datastoreItem>
-</file>
-
-<file path=customXml/itemProps3.xml><?xml version="1.0" encoding="utf-8"?>
-<ds:datastoreItem xmlns:ds="http://schemas.openxmlformats.org/officeDocument/2006/customXml" ds:itemID="{7B6F2769-7194-4217-93D3-3AF3A4742282}">
-  <ds:schemaRefs>
-    <ds:schemaRef ds:uri="http://schemas.microsoft.com/office/2006/metadata/properties"/>
-    <ds:schemaRef ds:uri="http://purl.org/dc/dcmitype/"/>
-    <ds:schemaRef ds:uri="http://schemas.microsoft.com/office/2006/documentManagement/types"/>
-    <ds:schemaRef ds:uri="http://purl.org/dc/terms/"/>
-    <ds:schemaRef ds:uri="http://schemas.microsoft.com/office/infopath/2007/PartnerControls"/>
-    <ds:schemaRef ds:uri="http://purl.org/dc/elements/1.1/"/>
-    <ds:schemaRef ds:uri="http://schemas.openxmlformats.org/package/2006/metadata/core-properties"/>
-    <ds:schemaRef ds:uri="http://schemas.microsoft.com/sharepoint/v3/fields"/>
-    <ds:schemaRef ds:uri="http://www.w3.org/XML/1998/namespace"/>
-  </ds:schemaRefs>
-</ds:datastoreItem>
 </file>
</xml_diff>